<commit_message>
Updated slides and notebooks
</commit_message>
<xml_diff>
--- a/practical_session_slides.pptx
+++ b/practical_session_slides.pptx
@@ -6,23 +6,28 @@
     <p:sldMasterId id="2147483660" r:id="rId2"/>
   </p:sldMasterIdLst>
   <p:notesMasterIdLst>
-    <p:notesMasterId r:id="rId17"/>
+    <p:notesMasterId r:id="rId22"/>
   </p:notesMasterIdLst>
   <p:sldIdLst>
     <p:sldId id="256" r:id="rId3"/>
-    <p:sldId id="711" r:id="rId4"/>
-    <p:sldId id="257" r:id="rId5"/>
-    <p:sldId id="439" r:id="rId6"/>
-    <p:sldId id="709" r:id="rId7"/>
-    <p:sldId id="693" r:id="rId8"/>
-    <p:sldId id="710" r:id="rId9"/>
-    <p:sldId id="712" r:id="rId10"/>
-    <p:sldId id="713" r:id="rId11"/>
-    <p:sldId id="716" r:id="rId12"/>
-    <p:sldId id="717" r:id="rId13"/>
-    <p:sldId id="718" r:id="rId14"/>
-    <p:sldId id="714" r:id="rId15"/>
-    <p:sldId id="715" r:id="rId16"/>
+    <p:sldId id="723" r:id="rId4"/>
+    <p:sldId id="719" r:id="rId5"/>
+    <p:sldId id="711" r:id="rId6"/>
+    <p:sldId id="257" r:id="rId7"/>
+    <p:sldId id="439" r:id="rId8"/>
+    <p:sldId id="709" r:id="rId9"/>
+    <p:sldId id="693" r:id="rId10"/>
+    <p:sldId id="710" r:id="rId11"/>
+    <p:sldId id="712" r:id="rId12"/>
+    <p:sldId id="713" r:id="rId13"/>
+    <p:sldId id="716" r:id="rId14"/>
+    <p:sldId id="717" r:id="rId15"/>
+    <p:sldId id="718" r:id="rId16"/>
+    <p:sldId id="720" r:id="rId17"/>
+    <p:sldId id="721" r:id="rId18"/>
+    <p:sldId id="722" r:id="rId19"/>
+    <p:sldId id="714" r:id="rId20"/>
+    <p:sldId id="715" r:id="rId21"/>
   </p:sldIdLst>
   <p:sldSz cx="12192000" cy="6858000"/>
   <p:notesSz cx="6858000" cy="9144000"/>
@@ -672,7 +677,7 @@
                 <a:tabLst/>
                 <a:defRPr/>
               </a:pPr>
-              <a:t>4</a:t>
+              <a:t>6</a:t>
             </a:fld>
             <a:endParaRPr kumimoji="0" lang="en-US" sz="1200" b="0" i="0" u="none" strike="noStrike" kern="1200" cap="none" spc="0" normalizeH="0" baseline="0" noProof="0">
               <a:ln>
@@ -843,7 +848,7 @@
                 <a:tabLst/>
                 <a:defRPr/>
               </a:pPr>
-              <a:t>5</a:t>
+              <a:t>7</a:t>
             </a:fld>
             <a:endParaRPr kumimoji="0" lang="en-US" sz="1200" b="0" i="0" u="none" strike="noStrike" kern="1200" cap="none" spc="0" normalizeH="0" baseline="0" noProof="0">
               <a:ln>
@@ -7333,7 +7338,9 @@
         </p:nvSpPr>
         <p:spPr/>
         <p:txBody>
-          <a:bodyPr/>
+          <a:bodyPr>
+            <a:normAutofit lnSpcReduction="10000"/>
+          </a:bodyPr>
           <a:lstStyle/>
           <a:p>
             <a:r>
@@ -7352,6 +7359,12 @@
             <a:r>
               <a:rPr lang="en-US" dirty="0"/>
               <a:t>Lindsey Kwok</a:t>
+            </a:r>
+          </a:p>
+          <a:p>
+            <a:r>
+              <a:rPr lang="en-US" sz="2000" dirty="0"/>
+              <a:t>(Mar 2026)</a:t>
             </a:r>
           </a:p>
         </p:txBody>
@@ -7370,6 +7383,746 @@
 </file>
 
 <file path=ppt/slides/slide10.xml><?xml version="1.0" encoding="utf-8"?>
+<p:sld xmlns:a="http://schemas.openxmlformats.org/drawingml/2006/main" xmlns:r="http://schemas.openxmlformats.org/officeDocument/2006/relationships" xmlns:p="http://schemas.openxmlformats.org/presentationml/2006/main">
+  <p:cSld>
+    <p:spTree>
+      <p:nvGrpSpPr>
+        <p:cNvPr id="1" name=""/>
+        <p:cNvGrpSpPr/>
+        <p:nvPr/>
+      </p:nvGrpSpPr>
+      <p:grpSpPr>
+        <a:xfrm>
+          <a:off x="0" y="0"/>
+          <a:ext cx="0" cy="0"/>
+          <a:chOff x="0" y="0"/>
+          <a:chExt cx="0" cy="0"/>
+        </a:xfrm>
+      </p:grpSpPr>
+      <p:sp>
+        <p:nvSpPr>
+          <p:cNvPr id="2" name="Title 1">
+            <a:extLst>
+              <a:ext uri="{FF2B5EF4-FFF2-40B4-BE49-F238E27FC236}">
+                <a16:creationId xmlns:a16="http://schemas.microsoft.com/office/drawing/2014/main" id="{C21875EA-A6D4-2627-0BF9-252D019BFF05}"/>
+              </a:ext>
+            </a:extLst>
+          </p:cNvPr>
+          <p:cNvSpPr>
+            <a:spLocks noGrp="1"/>
+          </p:cNvSpPr>
+          <p:nvPr>
+            <p:ph type="title"/>
+          </p:nvPr>
+        </p:nvSpPr>
+        <p:spPr>
+          <a:xfrm>
+            <a:off x="838200" y="0"/>
+            <a:ext cx="10515600" cy="1325563"/>
+          </a:xfrm>
+        </p:spPr>
+        <p:txBody>
+          <a:bodyPr/>
+          <a:lstStyle/>
+          <a:p>
+            <a:r>
+              <a:rPr lang="en-US" dirty="0"/>
+              <a:t>Line ID Rules of Engagement</a:t>
+            </a:r>
+          </a:p>
+        </p:txBody>
+      </p:sp>
+      <p:sp>
+        <p:nvSpPr>
+          <p:cNvPr id="3" name="Slide Number Placeholder 2">
+            <a:extLst>
+              <a:ext uri="{FF2B5EF4-FFF2-40B4-BE49-F238E27FC236}">
+                <a16:creationId xmlns:a16="http://schemas.microsoft.com/office/drawing/2014/main" id="{173D18EF-C420-32FE-5D98-364B1CD8CF5D}"/>
+              </a:ext>
+            </a:extLst>
+          </p:cNvPr>
+          <p:cNvSpPr>
+            <a:spLocks noGrp="1"/>
+          </p:cNvSpPr>
+          <p:nvPr>
+            <p:ph type="sldNum" sz="quarter" idx="12"/>
+          </p:nvPr>
+        </p:nvSpPr>
+        <p:spPr/>
+        <p:txBody>
+          <a:bodyPr/>
+          <a:lstStyle/>
+          <a:p>
+            <a:fld id="{CCACC368-8C51-0548-ABA7-03E9D6524DC5}" type="slidenum">
+              <a:rPr lang="en-US" smtClean="0"/>
+              <a:t>10</a:t>
+            </a:fld>
+            <a:endParaRPr lang="en-US"/>
+          </a:p>
+        </p:txBody>
+      </p:sp>
+      <p:sp>
+        <p:nvSpPr>
+          <p:cNvPr id="4" name="Content Placeholder 2">
+            <a:extLst>
+              <a:ext uri="{FF2B5EF4-FFF2-40B4-BE49-F238E27FC236}">
+                <a16:creationId xmlns:a16="http://schemas.microsoft.com/office/drawing/2014/main" id="{36894C8E-CCE9-181F-0C0E-B73741B8CEFF}"/>
+              </a:ext>
+            </a:extLst>
+          </p:cNvPr>
+          <p:cNvSpPr txBox="1">
+            <a:spLocks/>
+          </p:cNvSpPr>
+          <p:nvPr/>
+        </p:nvSpPr>
+        <p:spPr>
+          <a:xfrm>
+            <a:off x="838200" y="1253331"/>
+            <a:ext cx="10515600" cy="5260680"/>
+          </a:xfrm>
+          <a:prstGeom prst="rect">
+            <a:avLst/>
+          </a:prstGeom>
+        </p:spPr>
+        <p:txBody>
+          <a:bodyPr>
+            <a:normAutofit fontScale="70000" lnSpcReduction="20000"/>
+          </a:bodyPr>
+          <a:lstStyle>
+            <a:lvl1pPr marL="228600" indent="-228600" algn="l" defTabSz="914400" rtl="0" eaLnBrk="1" latinLnBrk="0" hangingPunct="1">
+              <a:lnSpc>
+                <a:spcPct val="90000"/>
+              </a:lnSpc>
+              <a:spcBef>
+                <a:spcPts val="1000"/>
+              </a:spcBef>
+              <a:buFont typeface="Arial" panose="020B0604020202020204" pitchFamily="34" charset="0"/>
+              <a:buChar char="•"/>
+              <a:defRPr sz="2800" kern="1200">
+                <a:solidFill>
+                  <a:schemeClr val="tx1"/>
+                </a:solidFill>
+                <a:latin typeface="+mn-lt"/>
+                <a:ea typeface="+mn-ea"/>
+                <a:cs typeface="+mn-cs"/>
+              </a:defRPr>
+            </a:lvl1pPr>
+            <a:lvl2pPr marL="685800" indent="-228600" algn="l" defTabSz="914400" rtl="0" eaLnBrk="1" latinLnBrk="0" hangingPunct="1">
+              <a:lnSpc>
+                <a:spcPct val="90000"/>
+              </a:lnSpc>
+              <a:spcBef>
+                <a:spcPts val="500"/>
+              </a:spcBef>
+              <a:buFont typeface="Arial" panose="020B0604020202020204" pitchFamily="34" charset="0"/>
+              <a:buChar char="•"/>
+              <a:defRPr sz="2400" kern="1200">
+                <a:solidFill>
+                  <a:schemeClr val="tx1"/>
+                </a:solidFill>
+                <a:latin typeface="+mn-lt"/>
+                <a:ea typeface="+mn-ea"/>
+                <a:cs typeface="+mn-cs"/>
+              </a:defRPr>
+            </a:lvl2pPr>
+            <a:lvl3pPr marL="1143000" indent="-228600" algn="l" defTabSz="914400" rtl="0" eaLnBrk="1" latinLnBrk="0" hangingPunct="1">
+              <a:lnSpc>
+                <a:spcPct val="90000"/>
+              </a:lnSpc>
+              <a:spcBef>
+                <a:spcPts val="500"/>
+              </a:spcBef>
+              <a:buFont typeface="Arial" panose="020B0604020202020204" pitchFamily="34" charset="0"/>
+              <a:buChar char="•"/>
+              <a:defRPr sz="2000" kern="1200">
+                <a:solidFill>
+                  <a:schemeClr val="tx1"/>
+                </a:solidFill>
+                <a:latin typeface="+mn-lt"/>
+                <a:ea typeface="+mn-ea"/>
+                <a:cs typeface="+mn-cs"/>
+              </a:defRPr>
+            </a:lvl3pPr>
+            <a:lvl4pPr marL="1600200" indent="-228600" algn="l" defTabSz="914400" rtl="0" eaLnBrk="1" latinLnBrk="0" hangingPunct="1">
+              <a:lnSpc>
+                <a:spcPct val="90000"/>
+              </a:lnSpc>
+              <a:spcBef>
+                <a:spcPts val="500"/>
+              </a:spcBef>
+              <a:buFont typeface="Arial" panose="020B0604020202020204" pitchFamily="34" charset="0"/>
+              <a:buChar char="•"/>
+              <a:defRPr sz="1800" kern="1200">
+                <a:solidFill>
+                  <a:schemeClr val="tx1"/>
+                </a:solidFill>
+                <a:latin typeface="+mn-lt"/>
+                <a:ea typeface="+mn-ea"/>
+                <a:cs typeface="+mn-cs"/>
+              </a:defRPr>
+            </a:lvl4pPr>
+            <a:lvl5pPr marL="2057400" indent="-228600" algn="l" defTabSz="914400" rtl="0" eaLnBrk="1" latinLnBrk="0" hangingPunct="1">
+              <a:lnSpc>
+                <a:spcPct val="90000"/>
+              </a:lnSpc>
+              <a:spcBef>
+                <a:spcPts val="500"/>
+              </a:spcBef>
+              <a:buFont typeface="Arial" panose="020B0604020202020204" pitchFamily="34" charset="0"/>
+              <a:buChar char="•"/>
+              <a:defRPr sz="1800" kern="1200">
+                <a:solidFill>
+                  <a:schemeClr val="tx1"/>
+                </a:solidFill>
+                <a:latin typeface="+mn-lt"/>
+                <a:ea typeface="+mn-ea"/>
+                <a:cs typeface="+mn-cs"/>
+              </a:defRPr>
+            </a:lvl5pPr>
+            <a:lvl6pPr marL="2514600" indent="-228600" algn="l" defTabSz="914400" rtl="0" eaLnBrk="1" latinLnBrk="0" hangingPunct="1">
+              <a:lnSpc>
+                <a:spcPct val="90000"/>
+              </a:lnSpc>
+              <a:spcBef>
+                <a:spcPts val="500"/>
+              </a:spcBef>
+              <a:buFont typeface="Arial" panose="020B0604020202020204" pitchFamily="34" charset="0"/>
+              <a:buChar char="•"/>
+              <a:defRPr sz="1800" kern="1200">
+                <a:solidFill>
+                  <a:schemeClr val="tx1"/>
+                </a:solidFill>
+                <a:latin typeface="+mn-lt"/>
+                <a:ea typeface="+mn-ea"/>
+                <a:cs typeface="+mn-cs"/>
+              </a:defRPr>
+            </a:lvl6pPr>
+            <a:lvl7pPr marL="2971800" indent="-228600" algn="l" defTabSz="914400" rtl="0" eaLnBrk="1" latinLnBrk="0" hangingPunct="1">
+              <a:lnSpc>
+                <a:spcPct val="90000"/>
+              </a:lnSpc>
+              <a:spcBef>
+                <a:spcPts val="500"/>
+              </a:spcBef>
+              <a:buFont typeface="Arial" panose="020B0604020202020204" pitchFamily="34" charset="0"/>
+              <a:buChar char="•"/>
+              <a:defRPr sz="1800" kern="1200">
+                <a:solidFill>
+                  <a:schemeClr val="tx1"/>
+                </a:solidFill>
+                <a:latin typeface="+mn-lt"/>
+                <a:ea typeface="+mn-ea"/>
+                <a:cs typeface="+mn-cs"/>
+              </a:defRPr>
+            </a:lvl7pPr>
+            <a:lvl8pPr marL="3429000" indent="-228600" algn="l" defTabSz="914400" rtl="0" eaLnBrk="1" latinLnBrk="0" hangingPunct="1">
+              <a:lnSpc>
+                <a:spcPct val="90000"/>
+              </a:lnSpc>
+              <a:spcBef>
+                <a:spcPts val="500"/>
+              </a:spcBef>
+              <a:buFont typeface="Arial" panose="020B0604020202020204" pitchFamily="34" charset="0"/>
+              <a:buChar char="•"/>
+              <a:defRPr sz="1800" kern="1200">
+                <a:solidFill>
+                  <a:schemeClr val="tx1"/>
+                </a:solidFill>
+                <a:latin typeface="+mn-lt"/>
+                <a:ea typeface="+mn-ea"/>
+                <a:cs typeface="+mn-cs"/>
+              </a:defRPr>
+            </a:lvl8pPr>
+            <a:lvl9pPr marL="3886200" indent="-228600" algn="l" defTabSz="914400" rtl="0" eaLnBrk="1" latinLnBrk="0" hangingPunct="1">
+              <a:lnSpc>
+                <a:spcPct val="90000"/>
+              </a:lnSpc>
+              <a:spcBef>
+                <a:spcPts val="500"/>
+              </a:spcBef>
+              <a:buFont typeface="Arial" panose="020B0604020202020204" pitchFamily="34" charset="0"/>
+              <a:buChar char="•"/>
+              <a:defRPr sz="1800" kern="1200">
+                <a:solidFill>
+                  <a:schemeClr val="tx1"/>
+                </a:solidFill>
+                <a:latin typeface="+mn-lt"/>
+                <a:ea typeface="+mn-ea"/>
+                <a:cs typeface="+mn-cs"/>
+              </a:defRPr>
+            </a:lvl9pPr>
+          </a:lstStyle>
+          <a:p>
+            <a:r>
+              <a:rPr lang="en-US" dirty="0"/>
+              <a:t>Let the physics inform your assumptions:</a:t>
+            </a:r>
+          </a:p>
+          <a:p>
+            <a:pPr lvl="1"/>
+            <a:r>
+              <a:rPr lang="en-US" dirty="0"/>
+              <a:t>Which ionization levels make sense? (e.g., [Ni X] NOT expected in SN Ia)</a:t>
+            </a:r>
+          </a:p>
+          <a:p>
+            <a:pPr lvl="1"/>
+            <a:r>
+              <a:rPr lang="en-US" dirty="0"/>
+              <a:t>Which elements are probable/possible? (e.g., no r-process in SN Ia)</a:t>
+            </a:r>
+          </a:p>
+          <a:p>
+            <a:r>
+              <a:rPr lang="en-US" dirty="0"/>
+              <a:t>Transitions from the same ion (e.g. [Ni II]) should share similar shape and velocities (FWHM and offset)</a:t>
+            </a:r>
+          </a:p>
+          <a:p>
+            <a:r>
+              <a:rPr lang="en-US" dirty="0"/>
+              <a:t>Forbidden transitions down to the ground state should be stronger than transitions between upper levels</a:t>
+            </a:r>
+          </a:p>
+          <a:p>
+            <a:r>
+              <a:rPr lang="en-US" dirty="0"/>
+              <a:t>In the nebular phase, stronger transitions are generally between lower levels, closer to the ground state.</a:t>
+            </a:r>
+          </a:p>
+          <a:p>
+            <a:r>
+              <a:rPr lang="en-US" dirty="0"/>
+              <a:t>Check whether there are lines from your ion at other wavelengths that are expected to be strong</a:t>
+            </a:r>
+          </a:p>
+          <a:p>
+            <a:r>
+              <a:rPr lang="en-US" dirty="0"/>
+              <a:t>If you have a line that *might* be something exciting, check whether it could be explained instead by a more mundane line</a:t>
+            </a:r>
+          </a:p>
+          <a:p>
+            <a:r>
+              <a:rPr lang="en-US" dirty="0"/>
+              <a:t>If model line lists (with expected strengths of lines) are available, check against them</a:t>
+            </a:r>
+          </a:p>
+          <a:p>
+            <a:r>
+              <a:rPr lang="en-US" dirty="0"/>
+              <a:t>Check line IDs from the literature</a:t>
+            </a:r>
+          </a:p>
+          <a:p>
+            <a:r>
+              <a:rPr lang="en-US" dirty="0"/>
+              <a:t>If there are multiple bumps/peaks to a feature, check carefully for possible line blending</a:t>
+            </a:r>
+          </a:p>
+          <a:p>
+            <a:r>
+              <a:rPr lang="en-US" dirty="0"/>
+              <a:t>Higher </a:t>
+            </a:r>
+            <a:r>
+              <a:rPr lang="en-US" dirty="0" err="1"/>
+              <a:t>A_ki</a:t>
+            </a:r>
+            <a:r>
+              <a:rPr lang="en-US" dirty="0"/>
+              <a:t> generally means line is expected to be stronger, but be careful to only compare within a small wavelength range</a:t>
+            </a:r>
+          </a:p>
+        </p:txBody>
+      </p:sp>
+      <p:sp>
+        <p:nvSpPr>
+          <p:cNvPr id="5" name="TextBox 4">
+            <a:extLst>
+              <a:ext uri="{FF2B5EF4-FFF2-40B4-BE49-F238E27FC236}">
+                <a16:creationId xmlns:a16="http://schemas.microsoft.com/office/drawing/2014/main" id="{BDC33B4B-65C5-1F7C-E7BA-2A7FD4CD33CA}"/>
+              </a:ext>
+            </a:extLst>
+          </p:cNvPr>
+          <p:cNvSpPr txBox="1"/>
+          <p:nvPr/>
+        </p:nvSpPr>
+        <p:spPr>
+          <a:xfrm>
+            <a:off x="8839200" y="383177"/>
+            <a:ext cx="2760756" cy="646331"/>
+          </a:xfrm>
+          <a:prstGeom prst="rect">
+            <a:avLst/>
+          </a:prstGeom>
+          <a:noFill/>
+        </p:spPr>
+        <p:txBody>
+          <a:bodyPr wrap="none" rtlCol="0">
+            <a:spAutoFit/>
+          </a:bodyPr>
+          <a:lstStyle/>
+          <a:p>
+            <a:r>
+              <a:rPr lang="en-US" dirty="0"/>
+              <a:t>Split into multiple slides</a:t>
+            </a:r>
+          </a:p>
+          <a:p>
+            <a:r>
+              <a:rPr lang="en-US" dirty="0"/>
+              <a:t>Show plots with examples</a:t>
+            </a:r>
+          </a:p>
+        </p:txBody>
+      </p:sp>
+    </p:spTree>
+    <p:extLst>
+      <p:ext uri="{BB962C8B-B14F-4D97-AF65-F5344CB8AC3E}">
+        <p14:creationId xmlns:p14="http://schemas.microsoft.com/office/powerpoint/2010/main" val="1884461476"/>
+      </p:ext>
+    </p:extLst>
+  </p:cSld>
+  <p:clrMapOvr>
+    <a:masterClrMapping/>
+  </p:clrMapOvr>
+</p:sld>
+</file>
+
+<file path=ppt/slides/slide11.xml><?xml version="1.0" encoding="utf-8"?>
+<p:sld xmlns:a="http://schemas.openxmlformats.org/drawingml/2006/main" xmlns:r="http://schemas.openxmlformats.org/officeDocument/2006/relationships" xmlns:p="http://schemas.openxmlformats.org/presentationml/2006/main">
+  <p:cSld>
+    <p:spTree>
+      <p:nvGrpSpPr>
+        <p:cNvPr id="1" name=""/>
+        <p:cNvGrpSpPr/>
+        <p:nvPr/>
+      </p:nvGrpSpPr>
+      <p:grpSpPr>
+        <a:xfrm>
+          <a:off x="0" y="0"/>
+          <a:ext cx="0" cy="0"/>
+          <a:chOff x="0" y="0"/>
+          <a:chExt cx="0" cy="0"/>
+        </a:xfrm>
+      </p:grpSpPr>
+      <p:sp>
+        <p:nvSpPr>
+          <p:cNvPr id="2" name="Title 1">
+            <a:extLst>
+              <a:ext uri="{FF2B5EF4-FFF2-40B4-BE49-F238E27FC236}">
+                <a16:creationId xmlns:a16="http://schemas.microsoft.com/office/drawing/2014/main" id="{1EA2F023-8DF3-2B8A-D502-4CD9B4CB0D5D}"/>
+              </a:ext>
+            </a:extLst>
+          </p:cNvPr>
+          <p:cNvSpPr>
+            <a:spLocks noGrp="1"/>
+          </p:cNvSpPr>
+          <p:nvPr>
+            <p:ph type="title"/>
+          </p:nvPr>
+        </p:nvSpPr>
+        <p:spPr>
+          <a:xfrm>
+            <a:off x="838200" y="18255"/>
+            <a:ext cx="10515600" cy="1325563"/>
+          </a:xfrm>
+        </p:spPr>
+        <p:txBody>
+          <a:bodyPr/>
+          <a:lstStyle/>
+          <a:p>
+            <a:r>
+              <a:rPr lang="en-US" dirty="0"/>
+              <a:t>Atomic Line List demo</a:t>
+            </a:r>
+          </a:p>
+        </p:txBody>
+      </p:sp>
+      <p:sp>
+        <p:nvSpPr>
+          <p:cNvPr id="5" name="Content Placeholder 4">
+            <a:extLst>
+              <a:ext uri="{FF2B5EF4-FFF2-40B4-BE49-F238E27FC236}">
+                <a16:creationId xmlns:a16="http://schemas.microsoft.com/office/drawing/2014/main" id="{0669752D-AED1-BCA5-32F0-CDB175B9AC3B}"/>
+              </a:ext>
+            </a:extLst>
+          </p:cNvPr>
+          <p:cNvSpPr>
+            <a:spLocks noGrp="1"/>
+          </p:cNvSpPr>
+          <p:nvPr>
+            <p:ph idx="1"/>
+          </p:nvPr>
+        </p:nvSpPr>
+        <p:spPr>
+          <a:xfrm>
+            <a:off x="838200" y="1253331"/>
+            <a:ext cx="10515600" cy="4351338"/>
+          </a:xfrm>
+        </p:spPr>
+        <p:txBody>
+          <a:bodyPr/>
+          <a:lstStyle/>
+          <a:p>
+            <a:pPr marL="0" indent="0">
+              <a:buNone/>
+            </a:pPr>
+            <a:r>
+              <a:rPr lang="en-US" dirty="0"/>
+              <a:t>Atomic Line List (</a:t>
+            </a:r>
+            <a:r>
+              <a:rPr lang="en-US" dirty="0">
+                <a:hlinkClick r:id="rId2"/>
+              </a:rPr>
+              <a:t>https://linelist.pa.uky.edu/newpage/</a:t>
+            </a:r>
+            <a:r>
+              <a:rPr lang="en-US" dirty="0"/>
+              <a:t>)</a:t>
+            </a:r>
+          </a:p>
+        </p:txBody>
+      </p:sp>
+      <p:sp>
+        <p:nvSpPr>
+          <p:cNvPr id="3" name="Slide Number Placeholder 2">
+            <a:extLst>
+              <a:ext uri="{FF2B5EF4-FFF2-40B4-BE49-F238E27FC236}">
+                <a16:creationId xmlns:a16="http://schemas.microsoft.com/office/drawing/2014/main" id="{8397628C-E88E-D0A8-198A-6EDD26AB7EB1}"/>
+              </a:ext>
+            </a:extLst>
+          </p:cNvPr>
+          <p:cNvSpPr>
+            <a:spLocks noGrp="1"/>
+          </p:cNvSpPr>
+          <p:nvPr>
+            <p:ph type="sldNum" sz="quarter" idx="12"/>
+          </p:nvPr>
+        </p:nvSpPr>
+        <p:spPr/>
+        <p:txBody>
+          <a:bodyPr/>
+          <a:lstStyle/>
+          <a:p>
+            <a:fld id="{CCACC368-8C51-0548-ABA7-03E9D6524DC5}" type="slidenum">
+              <a:rPr lang="en-US" smtClean="0"/>
+              <a:t>11</a:t>
+            </a:fld>
+            <a:endParaRPr lang="en-US"/>
+          </a:p>
+        </p:txBody>
+      </p:sp>
+      <p:pic>
+        <p:nvPicPr>
+          <p:cNvPr id="7" name="Picture 6" descr="A screenshot of a computer&#10;&#10;AI-generated content may be incorrect.">
+            <a:extLst>
+              <a:ext uri="{FF2B5EF4-FFF2-40B4-BE49-F238E27FC236}">
+                <a16:creationId xmlns:a16="http://schemas.microsoft.com/office/drawing/2014/main" id="{D894C417-FBBD-937F-C150-07537D19E43D}"/>
+              </a:ext>
+            </a:extLst>
+          </p:cNvPr>
+          <p:cNvPicPr>
+            <a:picLocks noChangeAspect="1"/>
+          </p:cNvPicPr>
+          <p:nvPr/>
+        </p:nvPicPr>
+        <p:blipFill>
+          <a:blip r:embed="rId3"/>
+          <a:stretch>
+            <a:fillRect/>
+          </a:stretch>
+        </p:blipFill>
+        <p:spPr>
+          <a:xfrm>
+            <a:off x="2209800" y="1825990"/>
+            <a:ext cx="7772400" cy="4712922"/>
+          </a:xfrm>
+          <a:prstGeom prst="rect">
+            <a:avLst/>
+          </a:prstGeom>
+        </p:spPr>
+      </p:pic>
+      <p:sp>
+        <p:nvSpPr>
+          <p:cNvPr id="8" name="TextBox 7">
+            <a:extLst>
+              <a:ext uri="{FF2B5EF4-FFF2-40B4-BE49-F238E27FC236}">
+                <a16:creationId xmlns:a16="http://schemas.microsoft.com/office/drawing/2014/main" id="{EAAD3817-DBAC-319B-8C5F-6A0E7818C64C}"/>
+              </a:ext>
+            </a:extLst>
+          </p:cNvPr>
+          <p:cNvSpPr txBox="1"/>
+          <p:nvPr/>
+        </p:nvSpPr>
+        <p:spPr>
+          <a:xfrm>
+            <a:off x="7346623" y="3429000"/>
+            <a:ext cx="4331507" cy="523220"/>
+          </a:xfrm>
+          <a:prstGeom prst="rect">
+            <a:avLst/>
+          </a:prstGeom>
+          <a:noFill/>
+        </p:spPr>
+        <p:txBody>
+          <a:bodyPr wrap="none" rtlCol="0">
+            <a:spAutoFit/>
+          </a:bodyPr>
+          <a:lstStyle/>
+          <a:p>
+            <a:r>
+              <a:rPr lang="en-US" sz="2800" dirty="0">
+                <a:solidFill>
+                  <a:srgbClr val="C00000"/>
+                </a:solidFill>
+              </a:rPr>
+              <a:t>specify a wavelength range</a:t>
+            </a:r>
+          </a:p>
+        </p:txBody>
+      </p:sp>
+      <p:sp>
+        <p:nvSpPr>
+          <p:cNvPr id="9" name="TextBox 8">
+            <a:extLst>
+              <a:ext uri="{FF2B5EF4-FFF2-40B4-BE49-F238E27FC236}">
+                <a16:creationId xmlns:a16="http://schemas.microsoft.com/office/drawing/2014/main" id="{E6C228B2-C359-6C75-7D47-616AC361E231}"/>
+              </a:ext>
+            </a:extLst>
+          </p:cNvPr>
+          <p:cNvSpPr txBox="1"/>
+          <p:nvPr/>
+        </p:nvSpPr>
+        <p:spPr>
+          <a:xfrm>
+            <a:off x="7346623" y="4348097"/>
+            <a:ext cx="3652218" cy="523220"/>
+          </a:xfrm>
+          <a:prstGeom prst="rect">
+            <a:avLst/>
+          </a:prstGeom>
+          <a:noFill/>
+        </p:spPr>
+        <p:txBody>
+          <a:bodyPr wrap="none" rtlCol="0">
+            <a:spAutoFit/>
+          </a:bodyPr>
+          <a:lstStyle/>
+          <a:p>
+            <a:r>
+              <a:rPr lang="en-US" sz="2800" dirty="0">
+                <a:solidFill>
+                  <a:srgbClr val="C00000"/>
+                </a:solidFill>
+              </a:rPr>
+              <a:t>don’t forget your units!</a:t>
+            </a:r>
+          </a:p>
+        </p:txBody>
+      </p:sp>
+      <p:cxnSp>
+        <p:nvCxnSpPr>
+          <p:cNvPr id="11" name="Straight Arrow Connector 10">
+            <a:extLst>
+              <a:ext uri="{FF2B5EF4-FFF2-40B4-BE49-F238E27FC236}">
+                <a16:creationId xmlns:a16="http://schemas.microsoft.com/office/drawing/2014/main" id="{7F10531D-3E1D-10CF-1E0A-E7AE33AEC0A0}"/>
+              </a:ext>
+            </a:extLst>
+          </p:cNvPr>
+          <p:cNvCxnSpPr/>
+          <p:nvPr/>
+        </p:nvCxnSpPr>
+        <p:spPr>
+          <a:xfrm flipH="1">
+            <a:off x="2922494" y="3690610"/>
+            <a:ext cx="4347882" cy="128355"/>
+          </a:xfrm>
+          <a:prstGeom prst="straightConnector1">
+            <a:avLst/>
+          </a:prstGeom>
+          <a:ln w="50800">
+            <a:solidFill>
+              <a:srgbClr val="C00000"/>
+            </a:solidFill>
+            <a:tailEnd type="arrow"/>
+          </a:ln>
+        </p:spPr>
+        <p:style>
+          <a:lnRef idx="2">
+            <a:schemeClr val="accent1"/>
+          </a:lnRef>
+          <a:fillRef idx="0">
+            <a:schemeClr val="accent1"/>
+          </a:fillRef>
+          <a:effectRef idx="1">
+            <a:schemeClr val="accent1"/>
+          </a:effectRef>
+          <a:fontRef idx="minor">
+            <a:schemeClr val="tx1"/>
+          </a:fontRef>
+        </p:style>
+      </p:cxnSp>
+      <p:cxnSp>
+        <p:nvCxnSpPr>
+          <p:cNvPr id="12" name="Straight Arrow Connector 11">
+            <a:extLst>
+              <a:ext uri="{FF2B5EF4-FFF2-40B4-BE49-F238E27FC236}">
+                <a16:creationId xmlns:a16="http://schemas.microsoft.com/office/drawing/2014/main" id="{0C0CB0F0-F6F3-2B16-D489-3FB6B174BFF3}"/>
+              </a:ext>
+            </a:extLst>
+          </p:cNvPr>
+          <p:cNvCxnSpPr>
+            <a:cxnSpLocks/>
+          </p:cNvCxnSpPr>
+          <p:nvPr/>
+        </p:nvCxnSpPr>
+        <p:spPr>
+          <a:xfrm flipH="1">
+            <a:off x="4639183" y="4609707"/>
+            <a:ext cx="2707440" cy="222549"/>
+          </a:xfrm>
+          <a:prstGeom prst="straightConnector1">
+            <a:avLst/>
+          </a:prstGeom>
+          <a:ln w="50800">
+            <a:solidFill>
+              <a:srgbClr val="C00000"/>
+            </a:solidFill>
+            <a:tailEnd type="arrow"/>
+          </a:ln>
+        </p:spPr>
+        <p:style>
+          <a:lnRef idx="2">
+            <a:schemeClr val="accent1"/>
+          </a:lnRef>
+          <a:fillRef idx="0">
+            <a:schemeClr val="accent1"/>
+          </a:fillRef>
+          <a:effectRef idx="1">
+            <a:schemeClr val="accent1"/>
+          </a:effectRef>
+          <a:fontRef idx="minor">
+            <a:schemeClr val="tx1"/>
+          </a:fontRef>
+        </p:style>
+      </p:cxnSp>
+    </p:spTree>
+    <p:extLst>
+      <p:ext uri="{BB962C8B-B14F-4D97-AF65-F5344CB8AC3E}">
+        <p14:creationId xmlns:p14="http://schemas.microsoft.com/office/powerpoint/2010/main" val="1027752663"/>
+      </p:ext>
+    </p:extLst>
+  </p:cSld>
+  <p:clrMapOvr>
+    <a:masterClrMapping/>
+  </p:clrMapOvr>
+</p:sld>
+</file>
+
+<file path=ppt/slides/slide12.xml><?xml version="1.0" encoding="utf-8"?>
 <p:sld xmlns:a="http://schemas.openxmlformats.org/drawingml/2006/main" xmlns:r="http://schemas.openxmlformats.org/officeDocument/2006/relationships" xmlns:p="http://schemas.openxmlformats.org/presentationml/2006/main">
   <p:cSld>
     <p:spTree>
@@ -7524,7 +8277,7 @@
           <a:p>
             <a:fld id="{CCACC368-8C51-0548-ABA7-03E9D6524DC5}" type="slidenum">
               <a:rPr lang="en-US" smtClean="0"/>
-              <a:t>10</a:t>
+              <a:t>12</a:t>
             </a:fld>
             <a:endParaRPr lang="en-US"/>
           </a:p>
@@ -7834,7 +8587,7 @@
 </p:sld>
 </file>
 
-<file path=ppt/slides/slide11.xml><?xml version="1.0" encoding="utf-8"?>
+<file path=ppt/slides/slide13.xml><?xml version="1.0" encoding="utf-8"?>
 <p:sld xmlns:a="http://schemas.openxmlformats.org/drawingml/2006/main" xmlns:r="http://schemas.openxmlformats.org/officeDocument/2006/relationships" xmlns:p="http://schemas.openxmlformats.org/presentationml/2006/main">
   <p:cSld>
     <p:spTree>
@@ -7989,7 +8742,7 @@
           <a:p>
             <a:fld id="{CCACC368-8C51-0548-ABA7-03E9D6524DC5}" type="slidenum">
               <a:rPr lang="en-US" smtClean="0"/>
-              <a:t>11</a:t>
+              <a:t>13</a:t>
             </a:fld>
             <a:endParaRPr lang="en-US"/>
           </a:p>
@@ -8101,7 +8854,7 @@
 </p:sld>
 </file>
 
-<file path=ppt/slides/slide12.xml><?xml version="1.0" encoding="utf-8"?>
+<file path=ppt/slides/slide14.xml><?xml version="1.0" encoding="utf-8"?>
 <p:sld xmlns:a="http://schemas.openxmlformats.org/drawingml/2006/main" xmlns:r="http://schemas.openxmlformats.org/officeDocument/2006/relationships" xmlns:p="http://schemas.openxmlformats.org/presentationml/2006/main">
   <p:cSld>
     <p:spTree>
@@ -8256,7 +9009,7 @@
           <a:p>
             <a:fld id="{CCACC368-8C51-0548-ABA7-03E9D6524DC5}" type="slidenum">
               <a:rPr lang="en-US" smtClean="0"/>
-              <a:t>12</a:t>
+              <a:t>14</a:t>
             </a:fld>
             <a:endParaRPr lang="en-US"/>
           </a:p>
@@ -8739,7 +9492,7 @@
 </p:sld>
 </file>
 
-<file path=ppt/slides/slide13.xml><?xml version="1.0" encoding="utf-8"?>
+<file path=ppt/slides/slide15.xml><?xml version="1.0" encoding="utf-8"?>
 <p:sld xmlns:a="http://schemas.openxmlformats.org/drawingml/2006/main" xmlns:r="http://schemas.openxmlformats.org/officeDocument/2006/relationships" xmlns:p="http://schemas.openxmlformats.org/presentationml/2006/main">
   <p:cSld>
     <p:spTree>
@@ -8761,7 +9514,7 @@
           <p:cNvPr id="2" name="Title 1">
             <a:extLst>
               <a:ext uri="{FF2B5EF4-FFF2-40B4-BE49-F238E27FC236}">
-                <a16:creationId xmlns:a16="http://schemas.microsoft.com/office/drawing/2014/main" id="{2E3BCF67-E315-F2E7-44BD-62A0FFB8F48C}"/>
+                <a16:creationId xmlns:a16="http://schemas.microsoft.com/office/drawing/2014/main" id="{628F2478-3B99-9341-B0DF-4DDD6F3BE79F}"/>
               </a:ext>
             </a:extLst>
           </p:cNvPr>
@@ -8779,7 +9532,7 @@
           <a:p>
             <a:r>
               <a:rPr lang="en-US" dirty="0"/>
-              <a:t>Complications</a:t>
+              <a:t>r-process element line IDs</a:t>
             </a:r>
           </a:p>
         </p:txBody>
@@ -8789,7 +9542,7 @@
           <p:cNvPr id="3" name="Content Placeholder 2">
             <a:extLst>
               <a:ext uri="{FF2B5EF4-FFF2-40B4-BE49-F238E27FC236}">
-                <a16:creationId xmlns:a16="http://schemas.microsoft.com/office/drawing/2014/main" id="{7A0563A4-6A78-CA70-7BD5-CD8F6F036126}"/>
+                <a16:creationId xmlns:a16="http://schemas.microsoft.com/office/drawing/2014/main" id="{5AFE5720-A0A2-39B4-D0AA-DD470D3DF3E7}"/>
               </a:ext>
             </a:extLst>
           </p:cNvPr>
@@ -8802,92 +9555,20 @@
         </p:nvSpPr>
         <p:spPr/>
         <p:txBody>
-          <a:bodyPr>
-            <a:normAutofit lnSpcReduction="10000"/>
-          </a:bodyPr>
+          <a:bodyPr/>
           <a:lstStyle/>
           <a:p>
             <a:r>
               <a:rPr lang="en-US" dirty="0"/>
-              <a:t>Line blending</a:t>
-            </a:r>
-          </a:p>
-          <a:p>
-            <a:pPr lvl="1"/>
-            <a:r>
-              <a:rPr lang="en-US" dirty="0"/>
-              <a:t>Optical and NIR can be much harder than MIR, depending on source</a:t>
-            </a:r>
-          </a:p>
-          <a:p>
-            <a:r>
-              <a:rPr lang="en-US" dirty="0"/>
-              <a:t>Dust and molecules</a:t>
-            </a:r>
-          </a:p>
-          <a:p>
-            <a:pPr lvl="1"/>
-            <a:r>
-              <a:rPr lang="en-US" dirty="0"/>
-              <a:t>Optical lines can be attenuated if dust is forming in the ejecta</a:t>
-            </a:r>
-          </a:p>
-          <a:p>
-            <a:pPr lvl="1"/>
-            <a:r>
-              <a:rPr lang="en-US" dirty="0"/>
-              <a:t>Molecular emission can arise in the NIR and MIR</a:t>
-            </a:r>
-          </a:p>
-          <a:p>
-            <a:pPr lvl="2"/>
-            <a:r>
-              <a:rPr lang="en-US" dirty="0"/>
-              <a:t>CO at 2.3 + 4.6 microns</a:t>
-            </a:r>
-          </a:p>
-          <a:p>
-            <a:pPr lvl="2"/>
-            <a:r>
-              <a:rPr lang="en-US" dirty="0"/>
-              <a:t>PAH lines at 3.3, 6.X, 7.5, 11.3 microns</a:t>
-            </a:r>
-          </a:p>
-          <a:p>
-            <a:pPr lvl="2"/>
-            <a:r>
-              <a:rPr lang="en-US" dirty="0"/>
-              <a:t>Generally broader and smoother</a:t>
-            </a:r>
-          </a:p>
-          <a:p>
-            <a:r>
-              <a:rPr lang="en-US" dirty="0"/>
-              <a:t>Asymmetries/anisotropies</a:t>
-            </a:r>
-          </a:p>
-          <a:p>
-            <a:r>
-              <a:rPr lang="en-US" dirty="0"/>
-              <a:t>3D effects we can’t fully reconstruct</a:t>
-            </a:r>
-          </a:p>
-          <a:p>
-            <a:r>
-              <a:rPr lang="en-US" dirty="0"/>
-              <a:t>Be aware of degeneracies</a:t>
-            </a:r>
-          </a:p>
-          <a:p>
-            <a:pPr lvl="1"/>
-            <a:endParaRPr lang="en-US" dirty="0"/>
+              <a:t>**content needs to be updated** =)</a:t>
+            </a:r>
           </a:p>
         </p:txBody>
       </p:sp>
     </p:spTree>
     <p:extLst>
       <p:ext uri="{BB962C8B-B14F-4D97-AF65-F5344CB8AC3E}">
-        <p14:creationId xmlns:p14="http://schemas.microsoft.com/office/powerpoint/2010/main" val="3797060594"/>
+        <p14:creationId xmlns:p14="http://schemas.microsoft.com/office/powerpoint/2010/main" val="3989952910"/>
       </p:ext>
     </p:extLst>
   </p:cSld>
@@ -8897,7 +9578,7 @@
 </p:sld>
 </file>
 
-<file path=ppt/slides/slide14.xml><?xml version="1.0" encoding="utf-8"?>
+<file path=ppt/slides/slide16.xml><?xml version="1.0" encoding="utf-8"?>
 <p:sld xmlns:a="http://schemas.openxmlformats.org/drawingml/2006/main" xmlns:r="http://schemas.openxmlformats.org/officeDocument/2006/relationships" xmlns:p="http://schemas.openxmlformats.org/presentationml/2006/main">
   <p:cSld>
     <p:spTree>
@@ -8919,6 +9600,383 @@
           <p:cNvPr id="2" name="Title 1">
             <a:extLst>
               <a:ext uri="{FF2B5EF4-FFF2-40B4-BE49-F238E27FC236}">
+                <a16:creationId xmlns:a16="http://schemas.microsoft.com/office/drawing/2014/main" id="{D599375F-E9BF-8644-3456-FF59C084945C}"/>
+              </a:ext>
+            </a:extLst>
+          </p:cNvPr>
+          <p:cNvSpPr>
+            <a:spLocks noGrp="1"/>
+          </p:cNvSpPr>
+          <p:nvPr>
+            <p:ph type="title"/>
+          </p:nvPr>
+        </p:nvSpPr>
+        <p:spPr/>
+        <p:txBody>
+          <a:bodyPr/>
+          <a:lstStyle/>
+          <a:p>
+            <a:r>
+              <a:rPr lang="en-US" dirty="0"/>
+              <a:t>Line ID exploration time</a:t>
+            </a:r>
+          </a:p>
+        </p:txBody>
+      </p:sp>
+      <p:sp>
+        <p:nvSpPr>
+          <p:cNvPr id="3" name="Content Placeholder 2">
+            <a:extLst>
+              <a:ext uri="{FF2B5EF4-FFF2-40B4-BE49-F238E27FC236}">
+                <a16:creationId xmlns:a16="http://schemas.microsoft.com/office/drawing/2014/main" id="{D52A666F-E83D-A32F-1FE4-784495565E8D}"/>
+              </a:ext>
+            </a:extLst>
+          </p:cNvPr>
+          <p:cNvSpPr>
+            <a:spLocks noGrp="1"/>
+          </p:cNvSpPr>
+          <p:nvPr>
+            <p:ph idx="1"/>
+          </p:nvPr>
+        </p:nvSpPr>
+        <p:spPr/>
+        <p:txBody>
+          <a:bodyPr/>
+          <a:lstStyle/>
+          <a:p>
+            <a:r>
+              <a:rPr lang="en-US" dirty="0" err="1"/>
+              <a:t>Jupyter</a:t>
+            </a:r>
+            <a:r>
+              <a:rPr lang="en-US" dirty="0"/>
+              <a:t> notebook exploration</a:t>
+            </a:r>
+          </a:p>
+          <a:p>
+            <a:r>
+              <a:rPr lang="en-US" sz="2400" dirty="0">
+                <a:hlinkClick r:id="rId2"/>
+              </a:rPr>
+              <a:t>LineID_exploration.ipynb</a:t>
+            </a:r>
+            <a:endParaRPr lang="en-US" sz="2400" dirty="0"/>
+          </a:p>
+          <a:p>
+            <a:endParaRPr lang="en-US" dirty="0"/>
+          </a:p>
+          <a:p>
+            <a:endParaRPr lang="en-US" dirty="0"/>
+          </a:p>
+        </p:txBody>
+      </p:sp>
+    </p:spTree>
+    <p:extLst>
+      <p:ext uri="{BB962C8B-B14F-4D97-AF65-F5344CB8AC3E}">
+        <p14:creationId xmlns:p14="http://schemas.microsoft.com/office/powerpoint/2010/main" val="2885685406"/>
+      </p:ext>
+    </p:extLst>
+  </p:cSld>
+  <p:clrMapOvr>
+    <a:masterClrMapping/>
+  </p:clrMapOvr>
+</p:sld>
+</file>
+
+<file path=ppt/slides/slide17.xml><?xml version="1.0" encoding="utf-8"?>
+<p:sld xmlns:a="http://schemas.openxmlformats.org/drawingml/2006/main" xmlns:r="http://schemas.openxmlformats.org/officeDocument/2006/relationships" xmlns:p="http://schemas.openxmlformats.org/presentationml/2006/main">
+  <p:cSld>
+    <p:spTree>
+      <p:nvGrpSpPr>
+        <p:cNvPr id="1" name="">
+          <a:extLst>
+            <a:ext uri="{FF2B5EF4-FFF2-40B4-BE49-F238E27FC236}">
+              <a16:creationId xmlns:a16="http://schemas.microsoft.com/office/drawing/2014/main" id="{C82EE910-43F8-4473-CFEC-C4E21D3FDC70}"/>
+            </a:ext>
+          </a:extLst>
+        </p:cNvPr>
+        <p:cNvGrpSpPr/>
+        <p:nvPr/>
+      </p:nvGrpSpPr>
+      <p:grpSpPr>
+        <a:xfrm>
+          <a:off x="0" y="0"/>
+          <a:ext cx="0" cy="0"/>
+          <a:chOff x="0" y="0"/>
+          <a:chExt cx="0" cy="0"/>
+        </a:xfrm>
+      </p:grpSpPr>
+      <p:sp>
+        <p:nvSpPr>
+          <p:cNvPr id="2" name="Title 1">
+            <a:extLst>
+              <a:ext uri="{FF2B5EF4-FFF2-40B4-BE49-F238E27FC236}">
+                <a16:creationId xmlns:a16="http://schemas.microsoft.com/office/drawing/2014/main" id="{4AAA67AA-5DEB-8E1C-4279-AC4D5F98EB9F}"/>
+              </a:ext>
+            </a:extLst>
+          </p:cNvPr>
+          <p:cNvSpPr>
+            <a:spLocks noGrp="1"/>
+          </p:cNvSpPr>
+          <p:nvPr>
+            <p:ph type="title"/>
+          </p:nvPr>
+        </p:nvSpPr>
+        <p:spPr/>
+        <p:txBody>
+          <a:bodyPr/>
+          <a:lstStyle/>
+          <a:p>
+            <a:r>
+              <a:rPr lang="en-US" dirty="0"/>
+              <a:t>Line profile geometry exploration time</a:t>
+            </a:r>
+          </a:p>
+        </p:txBody>
+      </p:sp>
+      <p:sp>
+        <p:nvSpPr>
+          <p:cNvPr id="3" name="Content Placeholder 2">
+            <a:extLst>
+              <a:ext uri="{FF2B5EF4-FFF2-40B4-BE49-F238E27FC236}">
+                <a16:creationId xmlns:a16="http://schemas.microsoft.com/office/drawing/2014/main" id="{9A9E4E08-905E-756D-498E-AA6D83670D9A}"/>
+              </a:ext>
+            </a:extLst>
+          </p:cNvPr>
+          <p:cNvSpPr>
+            <a:spLocks noGrp="1"/>
+          </p:cNvSpPr>
+          <p:nvPr>
+            <p:ph idx="1"/>
+          </p:nvPr>
+        </p:nvSpPr>
+        <p:spPr/>
+        <p:txBody>
+          <a:bodyPr/>
+          <a:lstStyle/>
+          <a:p>
+            <a:r>
+              <a:rPr lang="en-US" dirty="0" err="1"/>
+              <a:t>Jupyter</a:t>
+            </a:r>
+            <a:r>
+              <a:rPr lang="en-US" dirty="0"/>
+              <a:t> notebook exploration</a:t>
+            </a:r>
+          </a:p>
+          <a:p>
+            <a:r>
+              <a:rPr lang="en-US" sz="2400" dirty="0">
+                <a:hlinkClick r:id="rId2"/>
+              </a:rPr>
+              <a:t>Line_profile_geometries_exploration.ipynb</a:t>
+            </a:r>
+            <a:endParaRPr lang="en-US" sz="2400" dirty="0"/>
+          </a:p>
+          <a:p>
+            <a:pPr marL="0" indent="0">
+              <a:buNone/>
+            </a:pPr>
+            <a:endParaRPr lang="en-US" sz="3200" dirty="0"/>
+          </a:p>
+          <a:p>
+            <a:endParaRPr lang="en-US" dirty="0"/>
+          </a:p>
+        </p:txBody>
+      </p:sp>
+    </p:spTree>
+    <p:extLst>
+      <p:ext uri="{BB962C8B-B14F-4D97-AF65-F5344CB8AC3E}">
+        <p14:creationId xmlns:p14="http://schemas.microsoft.com/office/powerpoint/2010/main" val="2351779656"/>
+      </p:ext>
+    </p:extLst>
+  </p:cSld>
+  <p:clrMapOvr>
+    <a:masterClrMapping/>
+  </p:clrMapOvr>
+</p:sld>
+</file>
+
+<file path=ppt/slides/slide18.xml><?xml version="1.0" encoding="utf-8"?>
+<p:sld xmlns:a="http://schemas.openxmlformats.org/drawingml/2006/main" xmlns:r="http://schemas.openxmlformats.org/officeDocument/2006/relationships" xmlns:p="http://schemas.openxmlformats.org/presentationml/2006/main">
+  <p:cSld>
+    <p:spTree>
+      <p:nvGrpSpPr>
+        <p:cNvPr id="1" name=""/>
+        <p:cNvGrpSpPr/>
+        <p:nvPr/>
+      </p:nvGrpSpPr>
+      <p:grpSpPr>
+        <a:xfrm>
+          <a:off x="0" y="0"/>
+          <a:ext cx="0" cy="0"/>
+          <a:chOff x="0" y="0"/>
+          <a:chExt cx="0" cy="0"/>
+        </a:xfrm>
+      </p:grpSpPr>
+      <p:sp>
+        <p:nvSpPr>
+          <p:cNvPr id="2" name="Title 1">
+            <a:extLst>
+              <a:ext uri="{FF2B5EF4-FFF2-40B4-BE49-F238E27FC236}">
+                <a16:creationId xmlns:a16="http://schemas.microsoft.com/office/drawing/2014/main" id="{2E3BCF67-E315-F2E7-44BD-62A0FFB8F48C}"/>
+              </a:ext>
+            </a:extLst>
+          </p:cNvPr>
+          <p:cNvSpPr>
+            <a:spLocks noGrp="1"/>
+          </p:cNvSpPr>
+          <p:nvPr>
+            <p:ph type="title"/>
+          </p:nvPr>
+        </p:nvSpPr>
+        <p:spPr/>
+        <p:txBody>
+          <a:bodyPr/>
+          <a:lstStyle/>
+          <a:p>
+            <a:r>
+              <a:rPr lang="en-US" dirty="0"/>
+              <a:t>Complications</a:t>
+            </a:r>
+          </a:p>
+        </p:txBody>
+      </p:sp>
+      <p:sp>
+        <p:nvSpPr>
+          <p:cNvPr id="3" name="Content Placeholder 2">
+            <a:extLst>
+              <a:ext uri="{FF2B5EF4-FFF2-40B4-BE49-F238E27FC236}">
+                <a16:creationId xmlns:a16="http://schemas.microsoft.com/office/drawing/2014/main" id="{7A0563A4-6A78-CA70-7BD5-CD8F6F036126}"/>
+              </a:ext>
+            </a:extLst>
+          </p:cNvPr>
+          <p:cNvSpPr>
+            <a:spLocks noGrp="1"/>
+          </p:cNvSpPr>
+          <p:nvPr>
+            <p:ph idx="1"/>
+          </p:nvPr>
+        </p:nvSpPr>
+        <p:spPr/>
+        <p:txBody>
+          <a:bodyPr>
+            <a:normAutofit lnSpcReduction="10000"/>
+          </a:bodyPr>
+          <a:lstStyle/>
+          <a:p>
+            <a:r>
+              <a:rPr lang="en-US" dirty="0"/>
+              <a:t>Line blending</a:t>
+            </a:r>
+          </a:p>
+          <a:p>
+            <a:pPr lvl="1"/>
+            <a:r>
+              <a:rPr lang="en-US" dirty="0"/>
+              <a:t>Optical and NIR can be much harder than MIR, depending on source</a:t>
+            </a:r>
+          </a:p>
+          <a:p>
+            <a:r>
+              <a:rPr lang="en-US" dirty="0"/>
+              <a:t>Dust and molecules</a:t>
+            </a:r>
+          </a:p>
+          <a:p>
+            <a:pPr lvl="1"/>
+            <a:r>
+              <a:rPr lang="en-US" dirty="0"/>
+              <a:t>Optical lines can be attenuated if dust is forming in the ejecta</a:t>
+            </a:r>
+          </a:p>
+          <a:p>
+            <a:pPr lvl="1"/>
+            <a:r>
+              <a:rPr lang="en-US" dirty="0"/>
+              <a:t>Molecular emission can arise in the NIR and MIR</a:t>
+            </a:r>
+          </a:p>
+          <a:p>
+            <a:pPr lvl="2"/>
+            <a:r>
+              <a:rPr lang="en-US" dirty="0"/>
+              <a:t>CO at 2.3 + 4.6 microns</a:t>
+            </a:r>
+          </a:p>
+          <a:p>
+            <a:pPr lvl="2"/>
+            <a:r>
+              <a:rPr lang="en-US" dirty="0"/>
+              <a:t>PAH lines at 3.3, 6.X, 7.5, 11.3 microns</a:t>
+            </a:r>
+          </a:p>
+          <a:p>
+            <a:pPr lvl="2"/>
+            <a:r>
+              <a:rPr lang="en-US" dirty="0"/>
+              <a:t>Generally broader and smoother</a:t>
+            </a:r>
+          </a:p>
+          <a:p>
+            <a:r>
+              <a:rPr lang="en-US" dirty="0"/>
+              <a:t>Asymmetries/anisotropies</a:t>
+            </a:r>
+          </a:p>
+          <a:p>
+            <a:r>
+              <a:rPr lang="en-US" dirty="0"/>
+              <a:t>3D effects we can’t fully reconstruct</a:t>
+            </a:r>
+          </a:p>
+          <a:p>
+            <a:r>
+              <a:rPr lang="en-US" dirty="0"/>
+              <a:t>Be aware of degeneracies</a:t>
+            </a:r>
+          </a:p>
+          <a:p>
+            <a:pPr lvl="1"/>
+            <a:endParaRPr lang="en-US" dirty="0"/>
+          </a:p>
+        </p:txBody>
+      </p:sp>
+    </p:spTree>
+    <p:extLst>
+      <p:ext uri="{BB962C8B-B14F-4D97-AF65-F5344CB8AC3E}">
+        <p14:creationId xmlns:p14="http://schemas.microsoft.com/office/powerpoint/2010/main" val="3797060594"/>
+      </p:ext>
+    </p:extLst>
+  </p:cSld>
+  <p:clrMapOvr>
+    <a:masterClrMapping/>
+  </p:clrMapOvr>
+</p:sld>
+</file>
+
+<file path=ppt/slides/slide19.xml><?xml version="1.0" encoding="utf-8"?>
+<p:sld xmlns:a="http://schemas.openxmlformats.org/drawingml/2006/main" xmlns:r="http://schemas.openxmlformats.org/officeDocument/2006/relationships" xmlns:p="http://schemas.openxmlformats.org/presentationml/2006/main">
+  <p:cSld>
+    <p:spTree>
+      <p:nvGrpSpPr>
+        <p:cNvPr id="1" name=""/>
+        <p:cNvGrpSpPr/>
+        <p:nvPr/>
+      </p:nvGrpSpPr>
+      <p:grpSpPr>
+        <a:xfrm>
+          <a:off x="0" y="0"/>
+          <a:ext cx="0" cy="0"/>
+          <a:chOff x="0" y="0"/>
+          <a:chExt cx="0" cy="0"/>
+        </a:xfrm>
+      </p:grpSpPr>
+      <p:sp>
+        <p:nvSpPr>
+          <p:cNvPr id="2" name="Title 1">
+            <a:extLst>
+              <a:ext uri="{FF2B5EF4-FFF2-40B4-BE49-F238E27FC236}">
                 <a16:creationId xmlns:a16="http://schemas.microsoft.com/office/drawing/2014/main" id="{417E7623-3DC8-A5AE-BC4F-8EEA0CD6CA00}"/>
               </a:ext>
             </a:extLst>
@@ -8963,7 +10021,10 @@
           <a:bodyPr/>
           <a:lstStyle/>
           <a:p>
-            <a:endParaRPr lang="en-US" dirty="0"/>
+            <a:r>
+              <a:rPr lang="en-US" dirty="0"/>
+              <a:t>**need to update this** =)</a:t>
+            </a:r>
           </a:p>
         </p:txBody>
       </p:sp>
@@ -9002,6 +10063,284 @@
           <p:cNvPr id="2" name="Title 1">
             <a:extLst>
               <a:ext uri="{FF2B5EF4-FFF2-40B4-BE49-F238E27FC236}">
+                <a16:creationId xmlns:a16="http://schemas.microsoft.com/office/drawing/2014/main" id="{0569E64B-E743-9C28-33C3-3AE7A9195E9B}"/>
+              </a:ext>
+            </a:extLst>
+          </p:cNvPr>
+          <p:cNvSpPr>
+            <a:spLocks noGrp="1"/>
+          </p:cNvSpPr>
+          <p:nvPr>
+            <p:ph type="title"/>
+          </p:nvPr>
+        </p:nvSpPr>
+        <p:spPr/>
+        <p:txBody>
+          <a:bodyPr/>
+          <a:lstStyle/>
+          <a:p>
+            <a:r>
+              <a:rPr lang="en-US" dirty="0"/>
+              <a:t>Download materials (if you haven’t already)</a:t>
+            </a:r>
+          </a:p>
+        </p:txBody>
+      </p:sp>
+      <p:sp>
+        <p:nvSpPr>
+          <p:cNvPr id="3" name="Content Placeholder 2">
+            <a:extLst>
+              <a:ext uri="{FF2B5EF4-FFF2-40B4-BE49-F238E27FC236}">
+                <a16:creationId xmlns:a16="http://schemas.microsoft.com/office/drawing/2014/main" id="{26A2AB7C-9C26-0216-7DA5-EC27200B98F3}"/>
+              </a:ext>
+            </a:extLst>
+          </p:cNvPr>
+          <p:cNvSpPr>
+            <a:spLocks noGrp="1"/>
+          </p:cNvSpPr>
+          <p:nvPr>
+            <p:ph idx="1"/>
+          </p:nvPr>
+        </p:nvSpPr>
+        <p:spPr/>
+        <p:txBody>
+          <a:bodyPr/>
+          <a:lstStyle/>
+          <a:p>
+            <a:pPr marL="0" indent="0">
+              <a:buNone/>
+            </a:pPr>
+            <a:r>
+              <a:rPr lang="en-US" dirty="0"/>
+              <a:t>See the </a:t>
+            </a:r>
+            <a:r>
+              <a:rPr lang="en-US" dirty="0" err="1"/>
+              <a:t>README.md</a:t>
+            </a:r>
+            <a:r>
+              <a:rPr lang="en-US" dirty="0"/>
+              <a:t> at: </a:t>
+            </a:r>
+            <a:r>
+              <a:rPr lang="en-US" dirty="0">
+                <a:hlinkClick r:id="rId2"/>
+              </a:rPr>
+              <a:t>https://github.com/lindseykwok/AstroNuc2026_practical_session/tree/main</a:t>
+            </a:r>
+            <a:endParaRPr lang="en-US" dirty="0"/>
+          </a:p>
+          <a:p>
+            <a:pPr marL="0" indent="0">
+              <a:buNone/>
+            </a:pPr>
+            <a:endParaRPr lang="en-US" dirty="0"/>
+          </a:p>
+        </p:txBody>
+      </p:sp>
+    </p:spTree>
+    <p:extLst>
+      <p:ext uri="{BB962C8B-B14F-4D97-AF65-F5344CB8AC3E}">
+        <p14:creationId xmlns:p14="http://schemas.microsoft.com/office/powerpoint/2010/main" val="1576051723"/>
+      </p:ext>
+    </p:extLst>
+  </p:cSld>
+  <p:clrMapOvr>
+    <a:masterClrMapping/>
+  </p:clrMapOvr>
+</p:sld>
+</file>
+
+<file path=ppt/slides/slide3.xml><?xml version="1.0" encoding="utf-8"?>
+<p:sld xmlns:a="http://schemas.openxmlformats.org/drawingml/2006/main" xmlns:r="http://schemas.openxmlformats.org/officeDocument/2006/relationships" xmlns:p="http://schemas.openxmlformats.org/presentationml/2006/main">
+  <p:cSld>
+    <p:spTree>
+      <p:nvGrpSpPr>
+        <p:cNvPr id="1" name=""/>
+        <p:cNvGrpSpPr/>
+        <p:nvPr/>
+      </p:nvGrpSpPr>
+      <p:grpSpPr>
+        <a:xfrm>
+          <a:off x="0" y="0"/>
+          <a:ext cx="0" cy="0"/>
+          <a:chOff x="0" y="0"/>
+          <a:chExt cx="0" cy="0"/>
+        </a:xfrm>
+      </p:grpSpPr>
+      <p:sp>
+        <p:nvSpPr>
+          <p:cNvPr id="2" name="Title 1">
+            <a:extLst>
+              <a:ext uri="{FF2B5EF4-FFF2-40B4-BE49-F238E27FC236}">
+                <a16:creationId xmlns:a16="http://schemas.microsoft.com/office/drawing/2014/main" id="{12FCA1F1-5094-727C-1B28-C0E989D92091}"/>
+              </a:ext>
+            </a:extLst>
+          </p:cNvPr>
+          <p:cNvSpPr>
+            <a:spLocks noGrp="1"/>
+          </p:cNvSpPr>
+          <p:nvPr>
+            <p:ph type="title"/>
+          </p:nvPr>
+        </p:nvSpPr>
+        <p:spPr/>
+        <p:txBody>
+          <a:bodyPr/>
+          <a:lstStyle/>
+          <a:p>
+            <a:r>
+              <a:rPr lang="en-US" dirty="0"/>
+              <a:t>Session outline</a:t>
+            </a:r>
+          </a:p>
+        </p:txBody>
+      </p:sp>
+      <p:sp>
+        <p:nvSpPr>
+          <p:cNvPr id="3" name="Content Placeholder 2">
+            <a:extLst>
+              <a:ext uri="{FF2B5EF4-FFF2-40B4-BE49-F238E27FC236}">
+                <a16:creationId xmlns:a16="http://schemas.microsoft.com/office/drawing/2014/main" id="{B87C3AE0-AE8E-4998-1516-96B786B69E8B}"/>
+              </a:ext>
+            </a:extLst>
+          </p:cNvPr>
+          <p:cNvSpPr>
+            <a:spLocks noGrp="1"/>
+          </p:cNvSpPr>
+          <p:nvPr>
+            <p:ph idx="1"/>
+          </p:nvPr>
+        </p:nvSpPr>
+        <p:spPr/>
+        <p:txBody>
+          <a:bodyPr/>
+          <a:lstStyle/>
+          <a:p>
+            <a:pPr marL="0" indent="0">
+              <a:buNone/>
+            </a:pPr>
+            <a:r>
+              <a:rPr lang="en-US" dirty="0"/>
+              <a:t>10 min: Intro + background</a:t>
+            </a:r>
+          </a:p>
+          <a:p>
+            <a:pPr marL="0" indent="0">
+              <a:buNone/>
+            </a:pPr>
+            <a:r>
+              <a:rPr lang="en-US" dirty="0"/>
+              <a:t>10 min: Line identification rules + Atomic Line List demo</a:t>
+            </a:r>
+          </a:p>
+          <a:p>
+            <a:pPr marL="0" indent="0">
+              <a:buNone/>
+            </a:pPr>
+            <a:r>
+              <a:rPr lang="en-US" dirty="0"/>
+              <a:t>5 min: r-process elements</a:t>
+            </a:r>
+          </a:p>
+          <a:p>
+            <a:pPr marL="0" indent="0">
+              <a:buNone/>
+            </a:pPr>
+            <a:r>
+              <a:rPr lang="en-US" dirty="0"/>
+              <a:t>25 min: Line ID exploration – </a:t>
+            </a:r>
+            <a:r>
+              <a:rPr lang="en-US" dirty="0" err="1"/>
+              <a:t>Jupyter</a:t>
+            </a:r>
+            <a:r>
+              <a:rPr lang="en-US" dirty="0"/>
+              <a:t> notebook</a:t>
+            </a:r>
+          </a:p>
+          <a:p>
+            <a:pPr marL="0" indent="0">
+              <a:buNone/>
+            </a:pPr>
+            <a:r>
+              <a:rPr lang="en-US" dirty="0"/>
+              <a:t>5 min: Reconvene, discuss</a:t>
+            </a:r>
+          </a:p>
+          <a:p>
+            <a:pPr marL="0" indent="0">
+              <a:buNone/>
+            </a:pPr>
+            <a:r>
+              <a:rPr lang="en-US" dirty="0"/>
+              <a:t>20 min: Line profile geometry exploration – </a:t>
+            </a:r>
+            <a:r>
+              <a:rPr lang="en-US" dirty="0" err="1"/>
+              <a:t>Jupyter</a:t>
+            </a:r>
+            <a:r>
+              <a:rPr lang="en-US" dirty="0"/>
+              <a:t> notebook</a:t>
+            </a:r>
+          </a:p>
+          <a:p>
+            <a:pPr marL="0" indent="0">
+              <a:buNone/>
+            </a:pPr>
+            <a:r>
+              <a:rPr lang="en-US" dirty="0"/>
+              <a:t>10 min: Discussion of complications (3D effects, degeneracies)</a:t>
+            </a:r>
+          </a:p>
+          <a:p>
+            <a:pPr marL="0" indent="0">
+              <a:buNone/>
+            </a:pPr>
+            <a:r>
+              <a:rPr lang="en-US" dirty="0"/>
+              <a:t>5 min: wrap-up + takeaways</a:t>
+            </a:r>
+          </a:p>
+        </p:txBody>
+      </p:sp>
+    </p:spTree>
+    <p:extLst>
+      <p:ext uri="{BB962C8B-B14F-4D97-AF65-F5344CB8AC3E}">
+        <p14:creationId xmlns:p14="http://schemas.microsoft.com/office/powerpoint/2010/main" val="3902726611"/>
+      </p:ext>
+    </p:extLst>
+  </p:cSld>
+  <p:clrMapOvr>
+    <a:masterClrMapping/>
+  </p:clrMapOvr>
+</p:sld>
+</file>
+
+<file path=ppt/slides/slide4.xml><?xml version="1.0" encoding="utf-8"?>
+<p:sld xmlns:a="http://schemas.openxmlformats.org/drawingml/2006/main" xmlns:r="http://schemas.openxmlformats.org/officeDocument/2006/relationships" xmlns:p="http://schemas.openxmlformats.org/presentationml/2006/main">
+  <p:cSld>
+    <p:spTree>
+      <p:nvGrpSpPr>
+        <p:cNvPr id="1" name=""/>
+        <p:cNvGrpSpPr/>
+        <p:nvPr/>
+      </p:nvGrpSpPr>
+      <p:grpSpPr>
+        <a:xfrm>
+          <a:off x="0" y="0"/>
+          <a:ext cx="0" cy="0"/>
+          <a:chOff x="0" y="0"/>
+          <a:chExt cx="0" cy="0"/>
+        </a:xfrm>
+      </p:grpSpPr>
+      <p:sp>
+        <p:nvSpPr>
+          <p:cNvPr id="2" name="Title 1">
+            <a:extLst>
+              <a:ext uri="{FF2B5EF4-FFF2-40B4-BE49-F238E27FC236}">
                 <a16:creationId xmlns:a16="http://schemas.microsoft.com/office/drawing/2014/main" id="{75ACB769-88EE-7912-AAFF-0C3FA1B6CA1C}"/>
               </a:ext>
             </a:extLst>
@@ -9111,7 +10450,7 @@
 </p:sld>
 </file>
 
-<file path=ppt/slides/slide3.xml><?xml version="1.0" encoding="utf-8"?>
+<file path=ppt/slides/slide5.xml><?xml version="1.0" encoding="utf-8"?>
 <p:sld xmlns:a="http://schemas.openxmlformats.org/drawingml/2006/main" xmlns:r="http://schemas.openxmlformats.org/officeDocument/2006/relationships" xmlns:p="http://schemas.openxmlformats.org/presentationml/2006/main">
   <p:cSld>
     <p:spTree>
@@ -9249,7 +10588,7 @@
 </p:sld>
 </file>
 
-<file path=ppt/slides/slide4.xml><?xml version="1.0" encoding="utf-8"?>
+<file path=ppt/slides/slide6.xml><?xml version="1.0" encoding="utf-8"?>
 <p:sld xmlns:a="http://schemas.openxmlformats.org/drawingml/2006/main" xmlns:r="http://schemas.openxmlformats.org/officeDocument/2006/relationships" xmlns:p="http://schemas.openxmlformats.org/presentationml/2006/main">
   <p:cSld>
     <p:bg>
@@ -9505,7 +10844,7 @@
                 <a:tabLst/>
                 <a:defRPr/>
               </a:pPr>
-              <a:t>4</a:t>
+              <a:t>6</a:t>
             </a:fld>
             <a:endParaRPr kumimoji="0" lang="en-US" sz="1200" b="0" i="0" u="none" strike="noStrike" kern="1200" cap="none" spc="0" normalizeH="0" baseline="0" noProof="0">
               <a:ln>
@@ -9899,7 +11238,7 @@
 </p:sld>
 </file>
 
-<file path=ppt/slides/slide5.xml><?xml version="1.0" encoding="utf-8"?>
+<file path=ppt/slides/slide7.xml><?xml version="1.0" encoding="utf-8"?>
 <p:sld xmlns:a="http://schemas.openxmlformats.org/drawingml/2006/main" xmlns:r="http://schemas.openxmlformats.org/officeDocument/2006/relationships" xmlns:p="http://schemas.openxmlformats.org/presentationml/2006/main">
   <p:cSld>
     <p:bg>
@@ -10161,7 +11500,7 @@
                 <a:tabLst/>
                 <a:defRPr/>
               </a:pPr>
-              <a:t>5</a:t>
+              <a:t>7</a:t>
             </a:fld>
             <a:endParaRPr kumimoji="0" lang="en-US" sz="1200" b="0" i="0" u="none" strike="noStrike" kern="1200" cap="none" spc="0" normalizeH="0" baseline="0" noProof="0">
               <a:ln>
@@ -10576,7 +11915,7 @@
 </p:sld>
 </file>
 
-<file path=ppt/slides/slide6.xml><?xml version="1.0" encoding="utf-8"?>
+<file path=ppt/slides/slide8.xml><?xml version="1.0" encoding="utf-8"?>
 <p:sld xmlns:a="http://schemas.openxmlformats.org/drawingml/2006/main" xmlns:r="http://schemas.openxmlformats.org/officeDocument/2006/relationships" xmlns:p="http://schemas.openxmlformats.org/presentationml/2006/main">
   <p:cSld>
     <p:bg>
@@ -10717,7 +12056,7 @@
                 <a:tabLst/>
                 <a:defRPr/>
               </a:pPr>
-              <a:t>6</a:t>
+              <a:t>8</a:t>
             </a:fld>
             <a:endParaRPr kumimoji="0" lang="en-US" sz="1200" b="0" i="0" u="none" strike="noStrike" kern="1200" cap="none" spc="0" normalizeH="0" baseline="0" noProof="0">
               <a:ln>
@@ -11625,7 +12964,7 @@
 </p:sld>
 </file>
 
-<file path=ppt/slides/slide7.xml><?xml version="1.0" encoding="utf-8"?>
+<file path=ppt/slides/slide9.xml><?xml version="1.0" encoding="utf-8"?>
 <p:sld xmlns:a="http://schemas.openxmlformats.org/drawingml/2006/main" xmlns:r="http://schemas.openxmlformats.org/officeDocument/2006/relationships" xmlns:p="http://schemas.openxmlformats.org/presentationml/2006/main">
   <p:cSld>
     <p:bg>
@@ -11887,7 +13226,7 @@
                 <a:tabLst/>
                 <a:defRPr/>
               </a:pPr>
-              <a:t>7</a:t>
+              <a:t>9</a:t>
             </a:fld>
             <a:endParaRPr kumimoji="0" lang="en-US" sz="1200" b="0" i="0" u="none" strike="noStrike" kern="1200" cap="none" spc="0" normalizeH="0" baseline="0" noProof="0">
               <a:ln>
@@ -12633,746 +13972,6 @@
       <p:bldP spid="4" grpId="0"/>
     </p:bldLst>
   </p:timing>
-</p:sld>
-</file>
-
-<file path=ppt/slides/slide8.xml><?xml version="1.0" encoding="utf-8"?>
-<p:sld xmlns:a="http://schemas.openxmlformats.org/drawingml/2006/main" xmlns:r="http://schemas.openxmlformats.org/officeDocument/2006/relationships" xmlns:p="http://schemas.openxmlformats.org/presentationml/2006/main">
-  <p:cSld>
-    <p:spTree>
-      <p:nvGrpSpPr>
-        <p:cNvPr id="1" name=""/>
-        <p:cNvGrpSpPr/>
-        <p:nvPr/>
-      </p:nvGrpSpPr>
-      <p:grpSpPr>
-        <a:xfrm>
-          <a:off x="0" y="0"/>
-          <a:ext cx="0" cy="0"/>
-          <a:chOff x="0" y="0"/>
-          <a:chExt cx="0" cy="0"/>
-        </a:xfrm>
-      </p:grpSpPr>
-      <p:sp>
-        <p:nvSpPr>
-          <p:cNvPr id="2" name="Title 1">
-            <a:extLst>
-              <a:ext uri="{FF2B5EF4-FFF2-40B4-BE49-F238E27FC236}">
-                <a16:creationId xmlns:a16="http://schemas.microsoft.com/office/drawing/2014/main" id="{C21875EA-A6D4-2627-0BF9-252D019BFF05}"/>
-              </a:ext>
-            </a:extLst>
-          </p:cNvPr>
-          <p:cNvSpPr>
-            <a:spLocks noGrp="1"/>
-          </p:cNvSpPr>
-          <p:nvPr>
-            <p:ph type="title"/>
-          </p:nvPr>
-        </p:nvSpPr>
-        <p:spPr>
-          <a:xfrm>
-            <a:off x="838200" y="0"/>
-            <a:ext cx="10515600" cy="1325563"/>
-          </a:xfrm>
-        </p:spPr>
-        <p:txBody>
-          <a:bodyPr/>
-          <a:lstStyle/>
-          <a:p>
-            <a:r>
-              <a:rPr lang="en-US" dirty="0"/>
-              <a:t>Line ID Rules of Engagement</a:t>
-            </a:r>
-          </a:p>
-        </p:txBody>
-      </p:sp>
-      <p:sp>
-        <p:nvSpPr>
-          <p:cNvPr id="3" name="Slide Number Placeholder 2">
-            <a:extLst>
-              <a:ext uri="{FF2B5EF4-FFF2-40B4-BE49-F238E27FC236}">
-                <a16:creationId xmlns:a16="http://schemas.microsoft.com/office/drawing/2014/main" id="{173D18EF-C420-32FE-5D98-364B1CD8CF5D}"/>
-              </a:ext>
-            </a:extLst>
-          </p:cNvPr>
-          <p:cNvSpPr>
-            <a:spLocks noGrp="1"/>
-          </p:cNvSpPr>
-          <p:nvPr>
-            <p:ph type="sldNum" sz="quarter" idx="12"/>
-          </p:nvPr>
-        </p:nvSpPr>
-        <p:spPr/>
-        <p:txBody>
-          <a:bodyPr/>
-          <a:lstStyle/>
-          <a:p>
-            <a:fld id="{CCACC368-8C51-0548-ABA7-03E9D6524DC5}" type="slidenum">
-              <a:rPr lang="en-US" smtClean="0"/>
-              <a:t>8</a:t>
-            </a:fld>
-            <a:endParaRPr lang="en-US"/>
-          </a:p>
-        </p:txBody>
-      </p:sp>
-      <p:sp>
-        <p:nvSpPr>
-          <p:cNvPr id="4" name="Content Placeholder 2">
-            <a:extLst>
-              <a:ext uri="{FF2B5EF4-FFF2-40B4-BE49-F238E27FC236}">
-                <a16:creationId xmlns:a16="http://schemas.microsoft.com/office/drawing/2014/main" id="{36894C8E-CCE9-181F-0C0E-B73741B8CEFF}"/>
-              </a:ext>
-            </a:extLst>
-          </p:cNvPr>
-          <p:cNvSpPr txBox="1">
-            <a:spLocks/>
-          </p:cNvSpPr>
-          <p:nvPr/>
-        </p:nvSpPr>
-        <p:spPr>
-          <a:xfrm>
-            <a:off x="838200" y="1253331"/>
-            <a:ext cx="10515600" cy="5260680"/>
-          </a:xfrm>
-          <a:prstGeom prst="rect">
-            <a:avLst/>
-          </a:prstGeom>
-        </p:spPr>
-        <p:txBody>
-          <a:bodyPr>
-            <a:normAutofit fontScale="70000" lnSpcReduction="20000"/>
-          </a:bodyPr>
-          <a:lstStyle>
-            <a:lvl1pPr marL="228600" indent="-228600" algn="l" defTabSz="914400" rtl="0" eaLnBrk="1" latinLnBrk="0" hangingPunct="1">
-              <a:lnSpc>
-                <a:spcPct val="90000"/>
-              </a:lnSpc>
-              <a:spcBef>
-                <a:spcPts val="1000"/>
-              </a:spcBef>
-              <a:buFont typeface="Arial" panose="020B0604020202020204" pitchFamily="34" charset="0"/>
-              <a:buChar char="•"/>
-              <a:defRPr sz="2800" kern="1200">
-                <a:solidFill>
-                  <a:schemeClr val="tx1"/>
-                </a:solidFill>
-                <a:latin typeface="+mn-lt"/>
-                <a:ea typeface="+mn-ea"/>
-                <a:cs typeface="+mn-cs"/>
-              </a:defRPr>
-            </a:lvl1pPr>
-            <a:lvl2pPr marL="685800" indent="-228600" algn="l" defTabSz="914400" rtl="0" eaLnBrk="1" latinLnBrk="0" hangingPunct="1">
-              <a:lnSpc>
-                <a:spcPct val="90000"/>
-              </a:lnSpc>
-              <a:spcBef>
-                <a:spcPts val="500"/>
-              </a:spcBef>
-              <a:buFont typeface="Arial" panose="020B0604020202020204" pitchFamily="34" charset="0"/>
-              <a:buChar char="•"/>
-              <a:defRPr sz="2400" kern="1200">
-                <a:solidFill>
-                  <a:schemeClr val="tx1"/>
-                </a:solidFill>
-                <a:latin typeface="+mn-lt"/>
-                <a:ea typeface="+mn-ea"/>
-                <a:cs typeface="+mn-cs"/>
-              </a:defRPr>
-            </a:lvl2pPr>
-            <a:lvl3pPr marL="1143000" indent="-228600" algn="l" defTabSz="914400" rtl="0" eaLnBrk="1" latinLnBrk="0" hangingPunct="1">
-              <a:lnSpc>
-                <a:spcPct val="90000"/>
-              </a:lnSpc>
-              <a:spcBef>
-                <a:spcPts val="500"/>
-              </a:spcBef>
-              <a:buFont typeface="Arial" panose="020B0604020202020204" pitchFamily="34" charset="0"/>
-              <a:buChar char="•"/>
-              <a:defRPr sz="2000" kern="1200">
-                <a:solidFill>
-                  <a:schemeClr val="tx1"/>
-                </a:solidFill>
-                <a:latin typeface="+mn-lt"/>
-                <a:ea typeface="+mn-ea"/>
-                <a:cs typeface="+mn-cs"/>
-              </a:defRPr>
-            </a:lvl3pPr>
-            <a:lvl4pPr marL="1600200" indent="-228600" algn="l" defTabSz="914400" rtl="0" eaLnBrk="1" latinLnBrk="0" hangingPunct="1">
-              <a:lnSpc>
-                <a:spcPct val="90000"/>
-              </a:lnSpc>
-              <a:spcBef>
-                <a:spcPts val="500"/>
-              </a:spcBef>
-              <a:buFont typeface="Arial" panose="020B0604020202020204" pitchFamily="34" charset="0"/>
-              <a:buChar char="•"/>
-              <a:defRPr sz="1800" kern="1200">
-                <a:solidFill>
-                  <a:schemeClr val="tx1"/>
-                </a:solidFill>
-                <a:latin typeface="+mn-lt"/>
-                <a:ea typeface="+mn-ea"/>
-                <a:cs typeface="+mn-cs"/>
-              </a:defRPr>
-            </a:lvl4pPr>
-            <a:lvl5pPr marL="2057400" indent="-228600" algn="l" defTabSz="914400" rtl="0" eaLnBrk="1" latinLnBrk="0" hangingPunct="1">
-              <a:lnSpc>
-                <a:spcPct val="90000"/>
-              </a:lnSpc>
-              <a:spcBef>
-                <a:spcPts val="500"/>
-              </a:spcBef>
-              <a:buFont typeface="Arial" panose="020B0604020202020204" pitchFamily="34" charset="0"/>
-              <a:buChar char="•"/>
-              <a:defRPr sz="1800" kern="1200">
-                <a:solidFill>
-                  <a:schemeClr val="tx1"/>
-                </a:solidFill>
-                <a:latin typeface="+mn-lt"/>
-                <a:ea typeface="+mn-ea"/>
-                <a:cs typeface="+mn-cs"/>
-              </a:defRPr>
-            </a:lvl5pPr>
-            <a:lvl6pPr marL="2514600" indent="-228600" algn="l" defTabSz="914400" rtl="0" eaLnBrk="1" latinLnBrk="0" hangingPunct="1">
-              <a:lnSpc>
-                <a:spcPct val="90000"/>
-              </a:lnSpc>
-              <a:spcBef>
-                <a:spcPts val="500"/>
-              </a:spcBef>
-              <a:buFont typeface="Arial" panose="020B0604020202020204" pitchFamily="34" charset="0"/>
-              <a:buChar char="•"/>
-              <a:defRPr sz="1800" kern="1200">
-                <a:solidFill>
-                  <a:schemeClr val="tx1"/>
-                </a:solidFill>
-                <a:latin typeface="+mn-lt"/>
-                <a:ea typeface="+mn-ea"/>
-                <a:cs typeface="+mn-cs"/>
-              </a:defRPr>
-            </a:lvl6pPr>
-            <a:lvl7pPr marL="2971800" indent="-228600" algn="l" defTabSz="914400" rtl="0" eaLnBrk="1" latinLnBrk="0" hangingPunct="1">
-              <a:lnSpc>
-                <a:spcPct val="90000"/>
-              </a:lnSpc>
-              <a:spcBef>
-                <a:spcPts val="500"/>
-              </a:spcBef>
-              <a:buFont typeface="Arial" panose="020B0604020202020204" pitchFamily="34" charset="0"/>
-              <a:buChar char="•"/>
-              <a:defRPr sz="1800" kern="1200">
-                <a:solidFill>
-                  <a:schemeClr val="tx1"/>
-                </a:solidFill>
-                <a:latin typeface="+mn-lt"/>
-                <a:ea typeface="+mn-ea"/>
-                <a:cs typeface="+mn-cs"/>
-              </a:defRPr>
-            </a:lvl7pPr>
-            <a:lvl8pPr marL="3429000" indent="-228600" algn="l" defTabSz="914400" rtl="0" eaLnBrk="1" latinLnBrk="0" hangingPunct="1">
-              <a:lnSpc>
-                <a:spcPct val="90000"/>
-              </a:lnSpc>
-              <a:spcBef>
-                <a:spcPts val="500"/>
-              </a:spcBef>
-              <a:buFont typeface="Arial" panose="020B0604020202020204" pitchFamily="34" charset="0"/>
-              <a:buChar char="•"/>
-              <a:defRPr sz="1800" kern="1200">
-                <a:solidFill>
-                  <a:schemeClr val="tx1"/>
-                </a:solidFill>
-                <a:latin typeface="+mn-lt"/>
-                <a:ea typeface="+mn-ea"/>
-                <a:cs typeface="+mn-cs"/>
-              </a:defRPr>
-            </a:lvl8pPr>
-            <a:lvl9pPr marL="3886200" indent="-228600" algn="l" defTabSz="914400" rtl="0" eaLnBrk="1" latinLnBrk="0" hangingPunct="1">
-              <a:lnSpc>
-                <a:spcPct val="90000"/>
-              </a:lnSpc>
-              <a:spcBef>
-                <a:spcPts val="500"/>
-              </a:spcBef>
-              <a:buFont typeface="Arial" panose="020B0604020202020204" pitchFamily="34" charset="0"/>
-              <a:buChar char="•"/>
-              <a:defRPr sz="1800" kern="1200">
-                <a:solidFill>
-                  <a:schemeClr val="tx1"/>
-                </a:solidFill>
-                <a:latin typeface="+mn-lt"/>
-                <a:ea typeface="+mn-ea"/>
-                <a:cs typeface="+mn-cs"/>
-              </a:defRPr>
-            </a:lvl9pPr>
-          </a:lstStyle>
-          <a:p>
-            <a:r>
-              <a:rPr lang="en-US" dirty="0"/>
-              <a:t>Let the physics inform your assumptions:</a:t>
-            </a:r>
-          </a:p>
-          <a:p>
-            <a:pPr lvl="1"/>
-            <a:r>
-              <a:rPr lang="en-US" dirty="0"/>
-              <a:t>Which ionization levels make sense? (e.g., [Ni X] NOT expected in SN Ia)</a:t>
-            </a:r>
-          </a:p>
-          <a:p>
-            <a:pPr lvl="1"/>
-            <a:r>
-              <a:rPr lang="en-US" dirty="0"/>
-              <a:t>Which elements are probable/possible? (e.g., no r-process in SN Ia)</a:t>
-            </a:r>
-          </a:p>
-          <a:p>
-            <a:r>
-              <a:rPr lang="en-US" dirty="0"/>
-              <a:t>Transitions from the same ion (e.g. [Ni II]) should share similar shape and velocities (FWHM and offset)</a:t>
-            </a:r>
-          </a:p>
-          <a:p>
-            <a:r>
-              <a:rPr lang="en-US" dirty="0"/>
-              <a:t>Forbidden transitions down to the ground state should be stronger than transitions between upper levels</a:t>
-            </a:r>
-          </a:p>
-          <a:p>
-            <a:r>
-              <a:rPr lang="en-US" dirty="0"/>
-              <a:t>In the nebular phase, stronger transitions are generally between lower levels, closer to the ground state.</a:t>
-            </a:r>
-          </a:p>
-          <a:p>
-            <a:r>
-              <a:rPr lang="en-US" dirty="0"/>
-              <a:t>Check whether there are lines from your ion at other wavelengths that are expected to be strong</a:t>
-            </a:r>
-          </a:p>
-          <a:p>
-            <a:r>
-              <a:rPr lang="en-US" dirty="0"/>
-              <a:t>If you have a line that *might* be something exciting, check whether it could be explained instead by a more mundane line</a:t>
-            </a:r>
-          </a:p>
-          <a:p>
-            <a:r>
-              <a:rPr lang="en-US" dirty="0"/>
-              <a:t>If model line lists (with expected strengths of lines) are available, check against them</a:t>
-            </a:r>
-          </a:p>
-          <a:p>
-            <a:r>
-              <a:rPr lang="en-US" dirty="0"/>
-              <a:t>Check line IDs from the literature</a:t>
-            </a:r>
-          </a:p>
-          <a:p>
-            <a:r>
-              <a:rPr lang="en-US" dirty="0"/>
-              <a:t>If there are multiple bumps/peaks to a feature, check carefully for possible line blending</a:t>
-            </a:r>
-          </a:p>
-          <a:p>
-            <a:r>
-              <a:rPr lang="en-US" dirty="0"/>
-              <a:t>Higher </a:t>
-            </a:r>
-            <a:r>
-              <a:rPr lang="en-US" dirty="0" err="1"/>
-              <a:t>A_ki</a:t>
-            </a:r>
-            <a:r>
-              <a:rPr lang="en-US" dirty="0"/>
-              <a:t> generally means line is expected to be stronger, but be careful to only compare within a small wavelength range</a:t>
-            </a:r>
-          </a:p>
-        </p:txBody>
-      </p:sp>
-      <p:sp>
-        <p:nvSpPr>
-          <p:cNvPr id="5" name="TextBox 4">
-            <a:extLst>
-              <a:ext uri="{FF2B5EF4-FFF2-40B4-BE49-F238E27FC236}">
-                <a16:creationId xmlns:a16="http://schemas.microsoft.com/office/drawing/2014/main" id="{BDC33B4B-65C5-1F7C-E7BA-2A7FD4CD33CA}"/>
-              </a:ext>
-            </a:extLst>
-          </p:cNvPr>
-          <p:cNvSpPr txBox="1"/>
-          <p:nvPr/>
-        </p:nvSpPr>
-        <p:spPr>
-          <a:xfrm>
-            <a:off x="8839200" y="383177"/>
-            <a:ext cx="2760756" cy="646331"/>
-          </a:xfrm>
-          <a:prstGeom prst="rect">
-            <a:avLst/>
-          </a:prstGeom>
-          <a:noFill/>
-        </p:spPr>
-        <p:txBody>
-          <a:bodyPr wrap="none" rtlCol="0">
-            <a:spAutoFit/>
-          </a:bodyPr>
-          <a:lstStyle/>
-          <a:p>
-            <a:r>
-              <a:rPr lang="en-US" dirty="0"/>
-              <a:t>Split into multiple slides</a:t>
-            </a:r>
-          </a:p>
-          <a:p>
-            <a:r>
-              <a:rPr lang="en-US" dirty="0"/>
-              <a:t>Show plots with examples</a:t>
-            </a:r>
-          </a:p>
-        </p:txBody>
-      </p:sp>
-    </p:spTree>
-    <p:extLst>
-      <p:ext uri="{BB962C8B-B14F-4D97-AF65-F5344CB8AC3E}">
-        <p14:creationId xmlns:p14="http://schemas.microsoft.com/office/powerpoint/2010/main" val="1884461476"/>
-      </p:ext>
-    </p:extLst>
-  </p:cSld>
-  <p:clrMapOvr>
-    <a:masterClrMapping/>
-  </p:clrMapOvr>
-</p:sld>
-</file>
-
-<file path=ppt/slides/slide9.xml><?xml version="1.0" encoding="utf-8"?>
-<p:sld xmlns:a="http://schemas.openxmlformats.org/drawingml/2006/main" xmlns:r="http://schemas.openxmlformats.org/officeDocument/2006/relationships" xmlns:p="http://schemas.openxmlformats.org/presentationml/2006/main">
-  <p:cSld>
-    <p:spTree>
-      <p:nvGrpSpPr>
-        <p:cNvPr id="1" name=""/>
-        <p:cNvGrpSpPr/>
-        <p:nvPr/>
-      </p:nvGrpSpPr>
-      <p:grpSpPr>
-        <a:xfrm>
-          <a:off x="0" y="0"/>
-          <a:ext cx="0" cy="0"/>
-          <a:chOff x="0" y="0"/>
-          <a:chExt cx="0" cy="0"/>
-        </a:xfrm>
-      </p:grpSpPr>
-      <p:sp>
-        <p:nvSpPr>
-          <p:cNvPr id="2" name="Title 1">
-            <a:extLst>
-              <a:ext uri="{FF2B5EF4-FFF2-40B4-BE49-F238E27FC236}">
-                <a16:creationId xmlns:a16="http://schemas.microsoft.com/office/drawing/2014/main" id="{1EA2F023-8DF3-2B8A-D502-4CD9B4CB0D5D}"/>
-              </a:ext>
-            </a:extLst>
-          </p:cNvPr>
-          <p:cNvSpPr>
-            <a:spLocks noGrp="1"/>
-          </p:cNvSpPr>
-          <p:nvPr>
-            <p:ph type="title"/>
-          </p:nvPr>
-        </p:nvSpPr>
-        <p:spPr>
-          <a:xfrm>
-            <a:off x="838200" y="18255"/>
-            <a:ext cx="10515600" cy="1325563"/>
-          </a:xfrm>
-        </p:spPr>
-        <p:txBody>
-          <a:bodyPr/>
-          <a:lstStyle/>
-          <a:p>
-            <a:r>
-              <a:rPr lang="en-US" dirty="0"/>
-              <a:t>Atomic Line List demo</a:t>
-            </a:r>
-          </a:p>
-        </p:txBody>
-      </p:sp>
-      <p:sp>
-        <p:nvSpPr>
-          <p:cNvPr id="5" name="Content Placeholder 4">
-            <a:extLst>
-              <a:ext uri="{FF2B5EF4-FFF2-40B4-BE49-F238E27FC236}">
-                <a16:creationId xmlns:a16="http://schemas.microsoft.com/office/drawing/2014/main" id="{0669752D-AED1-BCA5-32F0-CDB175B9AC3B}"/>
-              </a:ext>
-            </a:extLst>
-          </p:cNvPr>
-          <p:cNvSpPr>
-            <a:spLocks noGrp="1"/>
-          </p:cNvSpPr>
-          <p:nvPr>
-            <p:ph idx="1"/>
-          </p:nvPr>
-        </p:nvSpPr>
-        <p:spPr>
-          <a:xfrm>
-            <a:off x="838200" y="1253331"/>
-            <a:ext cx="10515600" cy="4351338"/>
-          </a:xfrm>
-        </p:spPr>
-        <p:txBody>
-          <a:bodyPr/>
-          <a:lstStyle/>
-          <a:p>
-            <a:pPr marL="0" indent="0">
-              <a:buNone/>
-            </a:pPr>
-            <a:r>
-              <a:rPr lang="en-US" dirty="0"/>
-              <a:t>Atomic Line List (</a:t>
-            </a:r>
-            <a:r>
-              <a:rPr lang="en-US" dirty="0">
-                <a:hlinkClick r:id="rId2"/>
-              </a:rPr>
-              <a:t>https://linelist.pa.uky.edu/newpage/</a:t>
-            </a:r>
-            <a:r>
-              <a:rPr lang="en-US" dirty="0"/>
-              <a:t>)</a:t>
-            </a:r>
-          </a:p>
-        </p:txBody>
-      </p:sp>
-      <p:sp>
-        <p:nvSpPr>
-          <p:cNvPr id="3" name="Slide Number Placeholder 2">
-            <a:extLst>
-              <a:ext uri="{FF2B5EF4-FFF2-40B4-BE49-F238E27FC236}">
-                <a16:creationId xmlns:a16="http://schemas.microsoft.com/office/drawing/2014/main" id="{8397628C-E88E-D0A8-198A-6EDD26AB7EB1}"/>
-              </a:ext>
-            </a:extLst>
-          </p:cNvPr>
-          <p:cNvSpPr>
-            <a:spLocks noGrp="1"/>
-          </p:cNvSpPr>
-          <p:nvPr>
-            <p:ph type="sldNum" sz="quarter" idx="12"/>
-          </p:nvPr>
-        </p:nvSpPr>
-        <p:spPr/>
-        <p:txBody>
-          <a:bodyPr/>
-          <a:lstStyle/>
-          <a:p>
-            <a:fld id="{CCACC368-8C51-0548-ABA7-03E9D6524DC5}" type="slidenum">
-              <a:rPr lang="en-US" smtClean="0"/>
-              <a:t>9</a:t>
-            </a:fld>
-            <a:endParaRPr lang="en-US"/>
-          </a:p>
-        </p:txBody>
-      </p:sp>
-      <p:pic>
-        <p:nvPicPr>
-          <p:cNvPr id="7" name="Picture 6" descr="A screenshot of a computer&#10;&#10;AI-generated content may be incorrect.">
-            <a:extLst>
-              <a:ext uri="{FF2B5EF4-FFF2-40B4-BE49-F238E27FC236}">
-                <a16:creationId xmlns:a16="http://schemas.microsoft.com/office/drawing/2014/main" id="{D894C417-FBBD-937F-C150-07537D19E43D}"/>
-              </a:ext>
-            </a:extLst>
-          </p:cNvPr>
-          <p:cNvPicPr>
-            <a:picLocks noChangeAspect="1"/>
-          </p:cNvPicPr>
-          <p:nvPr/>
-        </p:nvPicPr>
-        <p:blipFill>
-          <a:blip r:embed="rId3"/>
-          <a:stretch>
-            <a:fillRect/>
-          </a:stretch>
-        </p:blipFill>
-        <p:spPr>
-          <a:xfrm>
-            <a:off x="2209800" y="1825990"/>
-            <a:ext cx="7772400" cy="4712922"/>
-          </a:xfrm>
-          <a:prstGeom prst="rect">
-            <a:avLst/>
-          </a:prstGeom>
-        </p:spPr>
-      </p:pic>
-      <p:sp>
-        <p:nvSpPr>
-          <p:cNvPr id="8" name="TextBox 7">
-            <a:extLst>
-              <a:ext uri="{FF2B5EF4-FFF2-40B4-BE49-F238E27FC236}">
-                <a16:creationId xmlns:a16="http://schemas.microsoft.com/office/drawing/2014/main" id="{EAAD3817-DBAC-319B-8C5F-6A0E7818C64C}"/>
-              </a:ext>
-            </a:extLst>
-          </p:cNvPr>
-          <p:cNvSpPr txBox="1"/>
-          <p:nvPr/>
-        </p:nvSpPr>
-        <p:spPr>
-          <a:xfrm>
-            <a:off x="7346623" y="3429000"/>
-            <a:ext cx="4331507" cy="523220"/>
-          </a:xfrm>
-          <a:prstGeom prst="rect">
-            <a:avLst/>
-          </a:prstGeom>
-          <a:noFill/>
-        </p:spPr>
-        <p:txBody>
-          <a:bodyPr wrap="none" rtlCol="0">
-            <a:spAutoFit/>
-          </a:bodyPr>
-          <a:lstStyle/>
-          <a:p>
-            <a:r>
-              <a:rPr lang="en-US" sz="2800" dirty="0">
-                <a:solidFill>
-                  <a:srgbClr val="C00000"/>
-                </a:solidFill>
-              </a:rPr>
-              <a:t>specify a wavelength range</a:t>
-            </a:r>
-          </a:p>
-        </p:txBody>
-      </p:sp>
-      <p:sp>
-        <p:nvSpPr>
-          <p:cNvPr id="9" name="TextBox 8">
-            <a:extLst>
-              <a:ext uri="{FF2B5EF4-FFF2-40B4-BE49-F238E27FC236}">
-                <a16:creationId xmlns:a16="http://schemas.microsoft.com/office/drawing/2014/main" id="{E6C228B2-C359-6C75-7D47-616AC361E231}"/>
-              </a:ext>
-            </a:extLst>
-          </p:cNvPr>
-          <p:cNvSpPr txBox="1"/>
-          <p:nvPr/>
-        </p:nvSpPr>
-        <p:spPr>
-          <a:xfrm>
-            <a:off x="7346623" y="4348097"/>
-            <a:ext cx="3652218" cy="523220"/>
-          </a:xfrm>
-          <a:prstGeom prst="rect">
-            <a:avLst/>
-          </a:prstGeom>
-          <a:noFill/>
-        </p:spPr>
-        <p:txBody>
-          <a:bodyPr wrap="none" rtlCol="0">
-            <a:spAutoFit/>
-          </a:bodyPr>
-          <a:lstStyle/>
-          <a:p>
-            <a:r>
-              <a:rPr lang="en-US" sz="2800" dirty="0">
-                <a:solidFill>
-                  <a:srgbClr val="C00000"/>
-                </a:solidFill>
-              </a:rPr>
-              <a:t>don’t forget your units!</a:t>
-            </a:r>
-          </a:p>
-        </p:txBody>
-      </p:sp>
-      <p:cxnSp>
-        <p:nvCxnSpPr>
-          <p:cNvPr id="11" name="Straight Arrow Connector 10">
-            <a:extLst>
-              <a:ext uri="{FF2B5EF4-FFF2-40B4-BE49-F238E27FC236}">
-                <a16:creationId xmlns:a16="http://schemas.microsoft.com/office/drawing/2014/main" id="{7F10531D-3E1D-10CF-1E0A-E7AE33AEC0A0}"/>
-              </a:ext>
-            </a:extLst>
-          </p:cNvPr>
-          <p:cNvCxnSpPr/>
-          <p:nvPr/>
-        </p:nvCxnSpPr>
-        <p:spPr>
-          <a:xfrm flipH="1">
-            <a:off x="2922494" y="3690610"/>
-            <a:ext cx="4347882" cy="128355"/>
-          </a:xfrm>
-          <a:prstGeom prst="straightConnector1">
-            <a:avLst/>
-          </a:prstGeom>
-          <a:ln w="50800">
-            <a:solidFill>
-              <a:srgbClr val="C00000"/>
-            </a:solidFill>
-            <a:tailEnd type="arrow"/>
-          </a:ln>
-        </p:spPr>
-        <p:style>
-          <a:lnRef idx="2">
-            <a:schemeClr val="accent1"/>
-          </a:lnRef>
-          <a:fillRef idx="0">
-            <a:schemeClr val="accent1"/>
-          </a:fillRef>
-          <a:effectRef idx="1">
-            <a:schemeClr val="accent1"/>
-          </a:effectRef>
-          <a:fontRef idx="minor">
-            <a:schemeClr val="tx1"/>
-          </a:fontRef>
-        </p:style>
-      </p:cxnSp>
-      <p:cxnSp>
-        <p:nvCxnSpPr>
-          <p:cNvPr id="12" name="Straight Arrow Connector 11">
-            <a:extLst>
-              <a:ext uri="{FF2B5EF4-FFF2-40B4-BE49-F238E27FC236}">
-                <a16:creationId xmlns:a16="http://schemas.microsoft.com/office/drawing/2014/main" id="{0C0CB0F0-F6F3-2B16-D489-3FB6B174BFF3}"/>
-              </a:ext>
-            </a:extLst>
-          </p:cNvPr>
-          <p:cNvCxnSpPr>
-            <a:cxnSpLocks/>
-          </p:cNvCxnSpPr>
-          <p:nvPr/>
-        </p:nvCxnSpPr>
-        <p:spPr>
-          <a:xfrm flipH="1">
-            <a:off x="4639183" y="4609707"/>
-            <a:ext cx="2707440" cy="222549"/>
-          </a:xfrm>
-          <a:prstGeom prst="straightConnector1">
-            <a:avLst/>
-          </a:prstGeom>
-          <a:ln w="50800">
-            <a:solidFill>
-              <a:srgbClr val="C00000"/>
-            </a:solidFill>
-            <a:tailEnd type="arrow"/>
-          </a:ln>
-        </p:spPr>
-        <p:style>
-          <a:lnRef idx="2">
-            <a:schemeClr val="accent1"/>
-          </a:lnRef>
-          <a:fillRef idx="0">
-            <a:schemeClr val="accent1"/>
-          </a:fillRef>
-          <a:effectRef idx="1">
-            <a:schemeClr val="accent1"/>
-          </a:effectRef>
-          <a:fontRef idx="minor">
-            <a:schemeClr val="tx1"/>
-          </a:fontRef>
-        </p:style>
-      </p:cxnSp>
-    </p:spTree>
-    <p:extLst>
-      <p:ext uri="{BB962C8B-B14F-4D97-AF65-F5344CB8AC3E}">
-        <p14:creationId xmlns:p14="http://schemas.microsoft.com/office/powerpoint/2010/main" val="1027752663"/>
-      </p:ext>
-    </p:extLst>
-  </p:cSld>
-  <p:clrMapOvr>
-    <a:masterClrMapping/>
-  </p:clrMapOvr>
 </p:sld>
 </file>
 

</xml_diff>